<commit_message>
updated presentation and fixed qutip error
</commit_message>
<xml_diff>
--- a/presentations/mcd.pptx
+++ b/presentations/mcd.pptx
@@ -20,12 +20,16 @@
     <p:sldId id="267" r:id="rId14"/>
     <p:sldId id="263" r:id="rId15"/>
     <p:sldId id="266" r:id="rId16"/>
-    <p:sldId id="268" r:id="rId17"/>
-    <p:sldId id="276" r:id="rId18"/>
-    <p:sldId id="278" r:id="rId19"/>
-    <p:sldId id="270" r:id="rId20"/>
-    <p:sldId id="260" r:id="rId21"/>
-    <p:sldId id="277" r:id="rId22"/>
+    <p:sldId id="280" r:id="rId17"/>
+    <p:sldId id="281" r:id="rId18"/>
+    <p:sldId id="282" r:id="rId19"/>
+    <p:sldId id="283" r:id="rId20"/>
+    <p:sldId id="268" r:id="rId21"/>
+    <p:sldId id="276" r:id="rId22"/>
+    <p:sldId id="278" r:id="rId23"/>
+    <p:sldId id="270" r:id="rId24"/>
+    <p:sldId id="260" r:id="rId25"/>
+    <p:sldId id="277" r:id="rId26"/>
   </p:sldIdLst>
   <p:sldSz cx="12192000" cy="6858000"/>
   <p:notesSz cx="6858000" cy="9144000"/>
@@ -263,7 +267,7 @@
           <a:p>
             <a:fld id="{A7130FF2-EB90-42DA-9729-A8D0DAD28543}" type="datetimeFigureOut">
               <a:rPr lang="en-US" smtClean="0"/>
-              <a:t>8/16/2022</a:t>
+              <a:t>8/29/2022</a:t>
             </a:fld>
             <a:endParaRPr lang="en-US"/>
           </a:p>
@@ -433,7 +437,7 @@
           <a:p>
             <a:fld id="{A7130FF2-EB90-42DA-9729-A8D0DAD28543}" type="datetimeFigureOut">
               <a:rPr lang="en-US" smtClean="0"/>
-              <a:t>8/16/2022</a:t>
+              <a:t>8/29/2022</a:t>
             </a:fld>
             <a:endParaRPr lang="en-US"/>
           </a:p>
@@ -613,7 +617,7 @@
           <a:p>
             <a:fld id="{A7130FF2-EB90-42DA-9729-A8D0DAD28543}" type="datetimeFigureOut">
               <a:rPr lang="en-US" smtClean="0"/>
-              <a:t>8/16/2022</a:t>
+              <a:t>8/29/2022</a:t>
             </a:fld>
             <a:endParaRPr lang="en-US"/>
           </a:p>
@@ -783,7 +787,7 @@
           <a:p>
             <a:fld id="{A7130FF2-EB90-42DA-9729-A8D0DAD28543}" type="datetimeFigureOut">
               <a:rPr lang="en-US" smtClean="0"/>
-              <a:t>8/16/2022</a:t>
+              <a:t>8/29/2022</a:t>
             </a:fld>
             <a:endParaRPr lang="en-US"/>
           </a:p>
@@ -1029,7 +1033,7 @@
           <a:p>
             <a:fld id="{A7130FF2-EB90-42DA-9729-A8D0DAD28543}" type="datetimeFigureOut">
               <a:rPr lang="en-US" smtClean="0"/>
-              <a:t>8/16/2022</a:t>
+              <a:t>8/29/2022</a:t>
             </a:fld>
             <a:endParaRPr lang="en-US"/>
           </a:p>
@@ -1261,7 +1265,7 @@
           <a:p>
             <a:fld id="{A7130FF2-EB90-42DA-9729-A8D0DAD28543}" type="datetimeFigureOut">
               <a:rPr lang="en-US" smtClean="0"/>
-              <a:t>8/16/2022</a:t>
+              <a:t>8/29/2022</a:t>
             </a:fld>
             <a:endParaRPr lang="en-US"/>
           </a:p>
@@ -1628,7 +1632,7 @@
           <a:p>
             <a:fld id="{A7130FF2-EB90-42DA-9729-A8D0DAD28543}" type="datetimeFigureOut">
               <a:rPr lang="en-US" smtClean="0"/>
-              <a:t>8/16/2022</a:t>
+              <a:t>8/29/2022</a:t>
             </a:fld>
             <a:endParaRPr lang="en-US"/>
           </a:p>
@@ -1746,7 +1750,7 @@
           <a:p>
             <a:fld id="{A7130FF2-EB90-42DA-9729-A8D0DAD28543}" type="datetimeFigureOut">
               <a:rPr lang="en-US" smtClean="0"/>
-              <a:t>8/16/2022</a:t>
+              <a:t>8/29/2022</a:t>
             </a:fld>
             <a:endParaRPr lang="en-US"/>
           </a:p>
@@ -1841,7 +1845,7 @@
           <a:p>
             <a:fld id="{A7130FF2-EB90-42DA-9729-A8D0DAD28543}" type="datetimeFigureOut">
               <a:rPr lang="en-US" smtClean="0"/>
-              <a:t>8/16/2022</a:t>
+              <a:t>8/29/2022</a:t>
             </a:fld>
             <a:endParaRPr lang="en-US"/>
           </a:p>
@@ -2118,7 +2122,7 @@
           <a:p>
             <a:fld id="{A7130FF2-EB90-42DA-9729-A8D0DAD28543}" type="datetimeFigureOut">
               <a:rPr lang="en-US" smtClean="0"/>
-              <a:t>8/16/2022</a:t>
+              <a:t>8/29/2022</a:t>
             </a:fld>
             <a:endParaRPr lang="en-US"/>
           </a:p>
@@ -2371,7 +2375,7 @@
           <a:p>
             <a:fld id="{A7130FF2-EB90-42DA-9729-A8D0DAD28543}" type="datetimeFigureOut">
               <a:rPr lang="en-US" smtClean="0"/>
-              <a:t>8/16/2022</a:t>
+              <a:t>8/29/2022</a:t>
             </a:fld>
             <a:endParaRPr lang="en-US"/>
           </a:p>
@@ -2584,7 +2588,7 @@
           <a:p>
             <a:fld id="{A7130FF2-EB90-42DA-9729-A8D0DAD28543}" type="datetimeFigureOut">
               <a:rPr lang="en-US" smtClean="0"/>
-              <a:t>8/16/2022</a:t>
+              <a:t>8/29/2022</a:t>
             </a:fld>
             <a:endParaRPr lang="en-US"/>
           </a:p>
@@ -3027,7 +3031,30 @@
           <a:bodyPr/>
           <a:lstStyle/>
           <a:p>
-            <a:endParaRPr lang="en-US"/>
+            <a:r>
+              <a:rPr lang="en-US" dirty="0" smtClean="0"/>
+              <a:t>August 28, 2022</a:t>
+            </a:r>
+            <a:endParaRPr lang="en-US" dirty="0" smtClean="0"/>
+          </a:p>
+          <a:p>
+            <a:r>
+              <a:rPr lang="en-US" dirty="0" smtClean="0"/>
+              <a:t>Eesh Gupta, </a:t>
+            </a:r>
+            <a:r>
+              <a:rPr lang="en-US" dirty="0" err="1" smtClean="0"/>
+              <a:t>Srivatsan</a:t>
+            </a:r>
+            <a:r>
+              <a:rPr lang="en-US" dirty="0" smtClean="0"/>
+              <a:t> </a:t>
+            </a:r>
+            <a:r>
+              <a:rPr lang="en-US" dirty="0" err="1" smtClean="0"/>
+              <a:t>Chakram</a:t>
+            </a:r>
+            <a:endParaRPr lang="en-US" dirty="0"/>
           </a:p>
         </p:txBody>
       </p:sp>
@@ -3767,6 +3794,13 @@
   <p:clrMapOvr>
     <a:masterClrMapping/>
   </p:clrMapOvr>
+  <p:timing>
+    <p:tnLst>
+      <p:par>
+        <p:cTn id="1" dur="indefinite" restart="never" nodeType="tmRoot"/>
+      </p:par>
+    </p:tnLst>
+  </p:timing>
 </p:sld>
 </file>
 
@@ -6943,6 +6977,13 @@
   <p:clrMapOvr>
     <a:masterClrMapping/>
   </p:clrMapOvr>
+  <p:timing>
+    <p:tnLst>
+      <p:par>
+        <p:cTn id="1" dur="indefinite" restart="never" nodeType="tmRoot"/>
+      </p:par>
+    </p:tnLst>
+  </p:timing>
 </p:sld>
 </file>
 
@@ -8912,6 +8953,13 @@
   <p:clrMapOvr>
     <a:masterClrMapping/>
   </p:clrMapOvr>
+  <p:timing>
+    <p:tnLst>
+      <p:par>
+        <p:cTn id="1" dur="indefinite" restart="never" nodeType="tmRoot"/>
+      </p:par>
+    </p:tnLst>
+  </p:timing>
 </p:sld>
 </file>
 
@@ -9112,6 +9160,13 @@
   <p:clrMapOvr>
     <a:masterClrMapping/>
   </p:clrMapOvr>
+  <p:timing>
+    <p:tnLst>
+      <p:par>
+        <p:cTn id="1" dur="indefinite" restart="never" nodeType="tmRoot"/>
+      </p:par>
+    </p:tnLst>
+  </p:timing>
 </p:sld>
 </file>
 
@@ -9375,6 +9430,1685 @@
 </file>
 
 <file path=ppt/slides/slide16.xml><?xml version="1.0" encoding="utf-8"?>
+<p:sld xmlns:a="http://schemas.openxmlformats.org/drawingml/2006/main" xmlns:r="http://schemas.openxmlformats.org/officeDocument/2006/relationships" xmlns:p="http://schemas.openxmlformats.org/presentationml/2006/main">
+  <p:cSld>
+    <p:spTree>
+      <p:nvGrpSpPr>
+        <p:cNvPr id="1" name=""/>
+        <p:cNvGrpSpPr/>
+        <p:nvPr/>
+      </p:nvGrpSpPr>
+      <p:grpSpPr>
+        <a:xfrm>
+          <a:off x="0" y="0"/>
+          <a:ext cx="0" cy="0"/>
+          <a:chOff x="0" y="0"/>
+          <a:chExt cx="0" cy="0"/>
+        </a:xfrm>
+      </p:grpSpPr>
+      <p:sp>
+        <p:nvSpPr>
+          <p:cNvPr id="2" name="Title 1"/>
+          <p:cNvSpPr>
+            <a:spLocks noGrp="1"/>
+          </p:cNvSpPr>
+          <p:nvPr>
+            <p:ph type="title"/>
+          </p:nvPr>
+        </p:nvSpPr>
+        <p:spPr/>
+        <p:txBody>
+          <a:bodyPr/>
+          <a:lstStyle/>
+          <a:p>
+            <a:r>
+              <a:rPr lang="en-US" dirty="0" smtClean="0"/>
+              <a:t>Two Mode ECD: </a:t>
+            </a:r>
+            <a:r>
+              <a:rPr lang="en-US" sz="3600" dirty="0" smtClean="0"/>
+              <a:t>Simultaneous State Transfer</a:t>
+            </a:r>
+            <a:endParaRPr lang="en-US" dirty="0"/>
+          </a:p>
+        </p:txBody>
+      </p:sp>
+      <p:pic>
+        <p:nvPicPr>
+          <p:cNvPr id="7" name="Picture 6"/>
+          <p:cNvPicPr>
+            <a:picLocks noChangeAspect="1"/>
+          </p:cNvPicPr>
+          <p:nvPr/>
+        </p:nvPicPr>
+        <p:blipFill rotWithShape="1">
+          <a:blip r:embed="rId2"/>
+          <a:srcRect t="10964"/>
+          <a:stretch/>
+        </p:blipFill>
+        <p:spPr>
+          <a:xfrm>
+            <a:off x="1592179" y="2307806"/>
+            <a:ext cx="9761621" cy="4345657"/>
+          </a:xfrm>
+          <a:prstGeom prst="rect">
+            <a:avLst/>
+          </a:prstGeom>
+        </p:spPr>
+      </p:pic>
+      <mc:AlternateContent xmlns:mc="http://schemas.openxmlformats.org/markup-compatibility/2006">
+        <mc:Choice xmlns:a14="http://schemas.microsoft.com/office/drawing/2010/main" Requires="a14">
+          <p:sp>
+            <p:nvSpPr>
+              <p:cNvPr id="8" name="TextBox 7"/>
+              <p:cNvSpPr txBox="1"/>
+              <p:nvPr/>
+            </p:nvSpPr>
+            <p:spPr>
+              <a:xfrm>
+                <a:off x="2510156" y="1732183"/>
+                <a:ext cx="7481985" cy="369332"/>
+              </a:xfrm>
+              <a:prstGeom prst="rect">
+                <a:avLst/>
+              </a:prstGeom>
+              <a:noFill/>
+            </p:spPr>
+            <p:txBody>
+              <a:bodyPr wrap="none" lIns="0" tIns="0" rIns="0" bIns="0" rtlCol="0">
+                <a:spAutoFit/>
+              </a:bodyPr>
+              <a:lstStyle/>
+              <a:p>
+                <a14:m>
+                  <m:oMath xmlns:m="http://schemas.openxmlformats.org/officeDocument/2006/math">
+                    <m:r>
+                      <a:rPr lang="en-US" sz="2400" b="1" i="1" smtClean="0">
+                        <a:latin typeface="Cambria Math" panose="02040503050406030204" pitchFamily="18" charset="0"/>
+                      </a:rPr>
+                      <m:t>𝒈</m:t>
+                    </m:r>
+                    <m:r>
+                      <a:rPr lang="en-US" sz="2400" b="1" i="1" smtClean="0">
+                        <a:latin typeface="Cambria Math" panose="02040503050406030204" pitchFamily="18" charset="0"/>
+                      </a:rPr>
+                      <m:t>𝟎𝟏</m:t>
+                    </m:r>
+                    <m:r>
+                      <a:rPr lang="en-US" sz="2400" b="1" i="1" smtClean="0">
+                        <a:latin typeface="Cambria Math" panose="02040503050406030204" pitchFamily="18" charset="0"/>
+                      </a:rPr>
+                      <m:t> →</m:t>
+                    </m:r>
+                    <m:r>
+                      <a:rPr lang="en-US" sz="2400" b="1" i="1" smtClean="0">
+                        <a:latin typeface="Cambria Math" panose="02040503050406030204" pitchFamily="18" charset="0"/>
+                      </a:rPr>
+                      <m:t>𝒈</m:t>
+                    </m:r>
+                    <m:r>
+                      <a:rPr lang="en-US" sz="2400" b="1" i="1" smtClean="0">
+                        <a:latin typeface="Cambria Math" panose="02040503050406030204" pitchFamily="18" charset="0"/>
+                      </a:rPr>
+                      <m:t>𝟏𝟎</m:t>
+                    </m:r>
+                    <m:r>
+                      <a:rPr lang="en-US" sz="2400" b="1" i="1" smtClean="0">
+                        <a:latin typeface="Cambria Math" panose="02040503050406030204" pitchFamily="18" charset="0"/>
+                      </a:rPr>
+                      <m:t>   </m:t>
+                    </m:r>
+                  </m:oMath>
+                </a14:m>
+                <a:r>
+                  <a:rPr lang="en-US" sz="2400" dirty="0" smtClean="0"/>
+                  <a:t>and   </a:t>
+                </a:r>
+                <a14:m>
+                  <m:oMath xmlns:m="http://schemas.openxmlformats.org/officeDocument/2006/math">
+                    <m:r>
+                      <a:rPr lang="en-US" sz="2400" b="1" i="1">
+                        <a:latin typeface="Cambria Math" panose="02040503050406030204" pitchFamily="18" charset="0"/>
+                      </a:rPr>
+                      <m:t>𝒈</m:t>
+                    </m:r>
+                    <m:r>
+                      <a:rPr lang="en-US" sz="2400" b="1" i="1">
+                        <a:latin typeface="Cambria Math" panose="02040503050406030204" pitchFamily="18" charset="0"/>
+                      </a:rPr>
+                      <m:t>𝟎𝟐</m:t>
+                    </m:r>
+                    <m:r>
+                      <a:rPr lang="en-US" sz="2400" b="1" i="1">
+                        <a:latin typeface="Cambria Math" panose="02040503050406030204" pitchFamily="18" charset="0"/>
+                      </a:rPr>
+                      <m:t> →</m:t>
+                    </m:r>
+                    <m:r>
+                      <a:rPr lang="en-US" sz="2400" b="1" i="1">
+                        <a:latin typeface="Cambria Math" panose="02040503050406030204" pitchFamily="18" charset="0"/>
+                      </a:rPr>
+                      <m:t>𝒈</m:t>
+                    </m:r>
+                    <m:r>
+                      <a:rPr lang="en-US" sz="2400" b="1" i="1" smtClean="0">
+                        <a:latin typeface="Cambria Math" panose="02040503050406030204" pitchFamily="18" charset="0"/>
+                      </a:rPr>
+                      <m:t>𝟐</m:t>
+                    </m:r>
+                    <m:r>
+                      <a:rPr lang="en-US" sz="2400" b="1" i="1">
+                        <a:latin typeface="Cambria Math" panose="02040503050406030204" pitchFamily="18" charset="0"/>
+                      </a:rPr>
+                      <m:t>𝟎</m:t>
+                    </m:r>
+                  </m:oMath>
+                </a14:m>
+                <a:r>
+                  <a:rPr lang="en-US" sz="2400" b="1" dirty="0" smtClean="0"/>
+                  <a:t>    </a:t>
+                </a:r>
+                <a:r>
+                  <a:rPr lang="en-US" sz="2400" dirty="0" smtClean="0"/>
+                  <a:t>(15 levels in each mode)</a:t>
+                </a:r>
+                <a:endParaRPr lang="en-US" sz="2400" dirty="0"/>
+              </a:p>
+            </p:txBody>
+          </p:sp>
+        </mc:Choice>
+        <mc:Fallback>
+          <p:sp>
+            <p:nvSpPr>
+              <p:cNvPr id="8" name="TextBox 7"/>
+              <p:cNvSpPr txBox="1">
+                <a:spLocks noRot="1" noChangeAspect="1" noMove="1" noResize="1" noEditPoints="1" noAdjustHandles="1" noChangeArrowheads="1" noChangeShapeType="1" noTextEdit="1"/>
+              </p:cNvSpPr>
+              <p:nvPr/>
+            </p:nvSpPr>
+            <p:spPr>
+              <a:xfrm>
+                <a:off x="2510156" y="1732183"/>
+                <a:ext cx="7481985" cy="369332"/>
+              </a:xfrm>
+              <a:prstGeom prst="rect">
+                <a:avLst/>
+              </a:prstGeom>
+              <a:blipFill rotWithShape="0">
+                <a:blip r:embed="rId3"/>
+                <a:stretch>
+                  <a:fillRect l="-1874" t="-24590" r="-1467" b="-49180"/>
+                </a:stretch>
+              </a:blipFill>
+            </p:spPr>
+            <p:txBody>
+              <a:bodyPr/>
+              <a:lstStyle/>
+              <a:p>
+                <a:r>
+                  <a:rPr lang="en-US">
+                    <a:noFill/>
+                  </a:rPr>
+                  <a:t> </a:t>
+                </a:r>
+              </a:p>
+            </p:txBody>
+          </p:sp>
+        </mc:Fallback>
+      </mc:AlternateContent>
+    </p:spTree>
+    <p:extLst>
+      <p:ext uri="{BB962C8B-B14F-4D97-AF65-F5344CB8AC3E}">
+        <p14:creationId xmlns:p14="http://schemas.microsoft.com/office/powerpoint/2010/main" val="348423343"/>
+      </p:ext>
+    </p:extLst>
+  </p:cSld>
+  <p:clrMapOvr>
+    <a:masterClrMapping/>
+  </p:clrMapOvr>
+  <p:timing>
+    <p:tnLst>
+      <p:par>
+        <p:cTn id="1" dur="indefinite" restart="never" nodeType="tmRoot"/>
+      </p:par>
+    </p:tnLst>
+  </p:timing>
+</p:sld>
+</file>
+
+<file path=ppt/slides/slide17.xml><?xml version="1.0" encoding="utf-8"?>
+<p:sld xmlns:a="http://schemas.openxmlformats.org/drawingml/2006/main" xmlns:r="http://schemas.openxmlformats.org/officeDocument/2006/relationships" xmlns:p="http://schemas.openxmlformats.org/presentationml/2006/main">
+  <p:cSld>
+    <p:spTree>
+      <p:nvGrpSpPr>
+        <p:cNvPr id="1" name=""/>
+        <p:cNvGrpSpPr/>
+        <p:nvPr/>
+      </p:nvGrpSpPr>
+      <p:grpSpPr>
+        <a:xfrm>
+          <a:off x="0" y="0"/>
+          <a:ext cx="0" cy="0"/>
+          <a:chOff x="0" y="0"/>
+          <a:chExt cx="0" cy="0"/>
+        </a:xfrm>
+      </p:grpSpPr>
+      <p:sp>
+        <p:nvSpPr>
+          <p:cNvPr id="2" name="Title 1"/>
+          <p:cNvSpPr>
+            <a:spLocks noGrp="1"/>
+          </p:cNvSpPr>
+          <p:nvPr>
+            <p:ph type="title"/>
+          </p:nvPr>
+        </p:nvSpPr>
+        <p:spPr/>
+        <p:txBody>
+          <a:bodyPr/>
+          <a:lstStyle/>
+          <a:p>
+            <a:r>
+              <a:rPr lang="en-US" dirty="0"/>
+              <a:t>Two Mode ECD: Simultaneous State Transfer</a:t>
+            </a:r>
+          </a:p>
+        </p:txBody>
+      </p:sp>
+      <p:pic>
+        <p:nvPicPr>
+          <p:cNvPr id="6" name="Picture 5"/>
+          <p:cNvPicPr>
+            <a:picLocks noChangeAspect="1"/>
+          </p:cNvPicPr>
+          <p:nvPr/>
+        </p:nvPicPr>
+        <p:blipFill>
+          <a:blip r:embed="rId2" cstate="print">
+            <a:extLst>
+              <a:ext uri="{28A0092B-C50C-407E-A947-70E740481C1C}">
+                <a14:useLocalDpi xmlns:a14="http://schemas.microsoft.com/office/drawing/2010/main" val="0"/>
+              </a:ext>
+            </a:extLst>
+          </a:blip>
+          <a:stretch>
+            <a:fillRect/>
+          </a:stretch>
+        </p:blipFill>
+        <p:spPr>
+          <a:xfrm>
+            <a:off x="4788568" y="1468655"/>
+            <a:ext cx="6736681" cy="5389345"/>
+          </a:xfrm>
+          <a:prstGeom prst="rect">
+            <a:avLst/>
+          </a:prstGeom>
+        </p:spPr>
+      </p:pic>
+      <mc:AlternateContent xmlns:mc="http://schemas.openxmlformats.org/markup-compatibility/2006">
+        <mc:Choice xmlns:a14="http://schemas.microsoft.com/office/drawing/2010/main" Requires="a14">
+          <p:sp>
+            <p:nvSpPr>
+              <p:cNvPr id="7" name="Rectangle 6"/>
+              <p:cNvSpPr/>
+              <p:nvPr/>
+            </p:nvSpPr>
+            <p:spPr>
+              <a:xfrm>
+                <a:off x="811132" y="2473850"/>
+                <a:ext cx="3038974" cy="2800767"/>
+              </a:xfrm>
+              <a:prstGeom prst="rect">
+                <a:avLst/>
+              </a:prstGeom>
+            </p:spPr>
+            <p:txBody>
+              <a:bodyPr wrap="square">
+                <a:spAutoFit/>
+              </a:bodyPr>
+              <a:lstStyle/>
+              <a:p>
+                <a:pPr marL="342900" indent="-342900">
+                  <a:buFont typeface="Arial" panose="020B0604020202020204" pitchFamily="34" charset="0"/>
+                  <a:buChar char="•"/>
+                </a:pPr>
+                <a:r>
+                  <a:rPr lang="en-US" sz="2400" b="1" dirty="0" smtClean="0">
+                    <a:latin typeface="Cambria Math" panose="02040503050406030204" pitchFamily="18" charset="0"/>
+                  </a:rPr>
+                  <a:t>Parameters Optimized </a:t>
+                </a:r>
+                <a:r>
+                  <a:rPr lang="en-US" sz="2400" dirty="0" smtClean="0">
+                    <a:latin typeface="Cambria Math" panose="02040503050406030204" pitchFamily="18" charset="0"/>
+                  </a:rPr>
+                  <a:t>for both </a:t>
+                </a:r>
+                <a14:m>
+                  <m:oMath xmlns:m="http://schemas.openxmlformats.org/officeDocument/2006/math">
+                    <m:r>
+                      <a:rPr lang="en-US" sz="2400" b="0" i="1">
+                        <a:latin typeface="Cambria Math" panose="02040503050406030204" pitchFamily="18" charset="0"/>
+                      </a:rPr>
+                      <m:t>𝑔</m:t>
+                    </m:r>
+                    <m:r>
+                      <a:rPr lang="en-US" sz="2400" b="0" i="1">
+                        <a:latin typeface="Cambria Math" panose="02040503050406030204" pitchFamily="18" charset="0"/>
+                      </a:rPr>
+                      <m:t>01 →</m:t>
+                    </m:r>
+                    <m:r>
+                      <a:rPr lang="en-US" sz="2400" b="0" i="1">
+                        <a:latin typeface="Cambria Math" panose="02040503050406030204" pitchFamily="18" charset="0"/>
+                      </a:rPr>
+                      <m:t>𝑔</m:t>
+                    </m:r>
+                    <m:r>
+                      <a:rPr lang="en-US" sz="2400" b="0" i="1">
+                        <a:latin typeface="Cambria Math" panose="02040503050406030204" pitchFamily="18" charset="0"/>
+                      </a:rPr>
+                      <m:t>10 </m:t>
+                    </m:r>
+                  </m:oMath>
+                </a14:m>
+                <a:r>
+                  <a:rPr lang="en-US" sz="2400" dirty="0" smtClean="0"/>
+                  <a:t>and   </a:t>
+                </a:r>
+                <a14:m>
+                  <m:oMath xmlns:m="http://schemas.openxmlformats.org/officeDocument/2006/math">
+                    <m:r>
+                      <a:rPr lang="en-US" sz="2400" b="0" i="1">
+                        <a:latin typeface="Cambria Math" panose="02040503050406030204" pitchFamily="18" charset="0"/>
+                      </a:rPr>
+                      <m:t>𝑔</m:t>
+                    </m:r>
+                    <m:r>
+                      <a:rPr lang="en-US" sz="2400" b="0" i="1">
+                        <a:latin typeface="Cambria Math" panose="02040503050406030204" pitchFamily="18" charset="0"/>
+                      </a:rPr>
+                      <m:t>02 →</m:t>
+                    </m:r>
+                    <m:r>
+                      <a:rPr lang="en-US" sz="2400" b="0" i="1">
+                        <a:latin typeface="Cambria Math" panose="02040503050406030204" pitchFamily="18" charset="0"/>
+                      </a:rPr>
+                      <m:t>𝑔</m:t>
+                    </m:r>
+                    <m:r>
+                      <a:rPr lang="en-US" sz="2400" b="0" i="1">
+                        <a:latin typeface="Cambria Math" panose="02040503050406030204" pitchFamily="18" charset="0"/>
+                      </a:rPr>
+                      <m:t>2</m:t>
+                    </m:r>
+                    <m:r>
+                      <a:rPr lang="en-US" sz="2400" b="0" i="1">
+                        <a:latin typeface="Cambria Math" panose="02040503050406030204" pitchFamily="18" charset="0"/>
+                      </a:rPr>
+                      <m:t>0</m:t>
+                    </m:r>
+                  </m:oMath>
+                </a14:m>
+                <a:endParaRPr lang="en-US" sz="2400" dirty="0" smtClean="0"/>
+              </a:p>
+              <a:p>
+                <a:pPr marL="342900" indent="-342900">
+                  <a:buFont typeface="Arial" panose="020B0604020202020204" pitchFamily="34" charset="0"/>
+                  <a:buChar char="•"/>
+                </a:pPr>
+                <a:endParaRPr lang="en-US" sz="2400" b="1" dirty="0" smtClean="0"/>
+              </a:p>
+              <a:p>
+                <a:pPr marL="342900" indent="-342900">
+                  <a:buFont typeface="Arial" panose="020B0604020202020204" pitchFamily="34" charset="0"/>
+                  <a:buChar char="•"/>
+                </a:pPr>
+                <a:r>
+                  <a:rPr lang="en-US" sz="2400" b="1" dirty="0" err="1" smtClean="0"/>
+                  <a:t>Qutip</a:t>
+                </a:r>
+                <a:r>
+                  <a:rPr lang="en-US" sz="2400" b="1" dirty="0" smtClean="0"/>
+                  <a:t> Simulation </a:t>
+                </a:r>
+                <a:r>
+                  <a:rPr lang="en-US" sz="2400" dirty="0" smtClean="0"/>
+                  <a:t>of </a:t>
+                </a:r>
+                <a14:m>
+                  <m:oMath xmlns:m="http://schemas.openxmlformats.org/officeDocument/2006/math">
+                    <m:r>
+                      <a:rPr lang="en-US" sz="3200" b="0" i="1" smtClean="0">
+                        <a:solidFill>
+                          <a:schemeClr val="accent2">
+                            <a:lumMod val="75000"/>
+                          </a:schemeClr>
+                        </a:solidFill>
+                        <a:latin typeface="Cambria Math" panose="02040503050406030204" pitchFamily="18" charset="0"/>
+                      </a:rPr>
+                      <m:t>𝑔</m:t>
+                    </m:r>
+                    <m:r>
+                      <a:rPr lang="en-US" sz="3200" b="0" i="1" smtClean="0">
+                        <a:solidFill>
+                          <a:schemeClr val="accent2">
+                            <a:lumMod val="75000"/>
+                          </a:schemeClr>
+                        </a:solidFill>
+                        <a:latin typeface="Cambria Math" panose="02040503050406030204" pitchFamily="18" charset="0"/>
+                      </a:rPr>
+                      <m:t>01 →</m:t>
+                    </m:r>
+                    <m:r>
+                      <a:rPr lang="en-US" sz="3200" b="0" i="1" smtClean="0">
+                        <a:solidFill>
+                          <a:srgbClr val="C51907"/>
+                        </a:solidFill>
+                        <a:latin typeface="Cambria Math" panose="02040503050406030204" pitchFamily="18" charset="0"/>
+                      </a:rPr>
+                      <m:t>𝑔</m:t>
+                    </m:r>
+                    <m:r>
+                      <a:rPr lang="en-US" sz="3200" b="0" i="1" smtClean="0">
+                        <a:solidFill>
+                          <a:srgbClr val="C51907"/>
+                        </a:solidFill>
+                        <a:latin typeface="Cambria Math" panose="02040503050406030204" pitchFamily="18" charset="0"/>
+                      </a:rPr>
+                      <m:t>10 </m:t>
+                    </m:r>
+                  </m:oMath>
+                </a14:m>
+                <a:endParaRPr lang="en-US" sz="3200" dirty="0"/>
+              </a:p>
+            </p:txBody>
+          </p:sp>
+        </mc:Choice>
+        <mc:Fallback>
+          <p:sp>
+            <p:nvSpPr>
+              <p:cNvPr id="7" name="Rectangle 6"/>
+              <p:cNvSpPr>
+                <a:spLocks noRot="1" noChangeAspect="1" noMove="1" noResize="1" noEditPoints="1" noAdjustHandles="1" noChangeArrowheads="1" noChangeShapeType="1" noTextEdit="1"/>
+              </p:cNvSpPr>
+              <p:nvPr/>
+            </p:nvSpPr>
+            <p:spPr>
+              <a:xfrm>
+                <a:off x="811132" y="2473850"/>
+                <a:ext cx="3038974" cy="2800767"/>
+              </a:xfrm>
+              <a:prstGeom prst="rect">
+                <a:avLst/>
+              </a:prstGeom>
+              <a:blipFill rotWithShape="0">
+                <a:blip r:embed="rId3"/>
+                <a:stretch>
+                  <a:fillRect l="-2605" t="-1743" r="-3808"/>
+                </a:stretch>
+              </a:blipFill>
+            </p:spPr>
+            <p:txBody>
+              <a:bodyPr/>
+              <a:lstStyle/>
+              <a:p>
+                <a:r>
+                  <a:rPr lang="en-US">
+                    <a:noFill/>
+                  </a:rPr>
+                  <a:t> </a:t>
+                </a:r>
+              </a:p>
+            </p:txBody>
+          </p:sp>
+        </mc:Fallback>
+      </mc:AlternateContent>
+    </p:spTree>
+    <p:extLst>
+      <p:ext uri="{BB962C8B-B14F-4D97-AF65-F5344CB8AC3E}">
+        <p14:creationId xmlns:p14="http://schemas.microsoft.com/office/powerpoint/2010/main" val="1410223556"/>
+      </p:ext>
+    </p:extLst>
+  </p:cSld>
+  <p:clrMapOvr>
+    <a:masterClrMapping/>
+  </p:clrMapOvr>
+  <p:timing>
+    <p:tnLst>
+      <p:par>
+        <p:cTn id="1" dur="indefinite" restart="never" nodeType="tmRoot"/>
+      </p:par>
+    </p:tnLst>
+  </p:timing>
+</p:sld>
+</file>
+
+<file path=ppt/slides/slide18.xml><?xml version="1.0" encoding="utf-8"?>
+<p:sld xmlns:a="http://schemas.openxmlformats.org/drawingml/2006/main" xmlns:r="http://schemas.openxmlformats.org/officeDocument/2006/relationships" xmlns:p="http://schemas.openxmlformats.org/presentationml/2006/main">
+  <p:cSld>
+    <p:spTree>
+      <p:nvGrpSpPr>
+        <p:cNvPr id="1" name=""/>
+        <p:cNvGrpSpPr/>
+        <p:nvPr/>
+      </p:nvGrpSpPr>
+      <p:grpSpPr>
+        <a:xfrm>
+          <a:off x="0" y="0"/>
+          <a:ext cx="0" cy="0"/>
+          <a:chOff x="0" y="0"/>
+          <a:chExt cx="0" cy="0"/>
+        </a:xfrm>
+      </p:grpSpPr>
+      <p:sp>
+        <p:nvSpPr>
+          <p:cNvPr id="2" name="Title 1"/>
+          <p:cNvSpPr>
+            <a:spLocks noGrp="1"/>
+          </p:cNvSpPr>
+          <p:nvPr>
+            <p:ph type="title"/>
+          </p:nvPr>
+        </p:nvSpPr>
+        <p:spPr/>
+        <p:txBody>
+          <a:bodyPr/>
+          <a:lstStyle/>
+          <a:p>
+            <a:r>
+              <a:rPr lang="en-US" dirty="0"/>
+              <a:t>Two Mode ECD: Simultaneous State Transfer</a:t>
+            </a:r>
+          </a:p>
+        </p:txBody>
+      </p:sp>
+      <mc:AlternateContent xmlns:mc="http://schemas.openxmlformats.org/markup-compatibility/2006">
+        <mc:Choice xmlns:a14="http://schemas.microsoft.com/office/drawing/2010/main" Requires="a14">
+          <p:sp>
+            <p:nvSpPr>
+              <p:cNvPr id="7" name="Rectangle 6"/>
+              <p:cNvSpPr/>
+              <p:nvPr/>
+            </p:nvSpPr>
+            <p:spPr>
+              <a:xfrm>
+                <a:off x="811132" y="2473850"/>
+                <a:ext cx="3038974" cy="2800767"/>
+              </a:xfrm>
+              <a:prstGeom prst="rect">
+                <a:avLst/>
+              </a:prstGeom>
+            </p:spPr>
+            <p:txBody>
+              <a:bodyPr wrap="square">
+                <a:spAutoFit/>
+              </a:bodyPr>
+              <a:lstStyle/>
+              <a:p>
+                <a:pPr marL="342900" indent="-342900">
+                  <a:buFont typeface="Arial" panose="020B0604020202020204" pitchFamily="34" charset="0"/>
+                  <a:buChar char="•"/>
+                </a:pPr>
+                <a:r>
+                  <a:rPr lang="en-US" sz="2400" b="1" dirty="0" smtClean="0">
+                    <a:latin typeface="Cambria Math" panose="02040503050406030204" pitchFamily="18" charset="0"/>
+                  </a:rPr>
+                  <a:t>Parameters Optimized </a:t>
+                </a:r>
+                <a:r>
+                  <a:rPr lang="en-US" sz="2400" dirty="0" smtClean="0">
+                    <a:latin typeface="Cambria Math" panose="02040503050406030204" pitchFamily="18" charset="0"/>
+                  </a:rPr>
+                  <a:t>for both </a:t>
+                </a:r>
+                <a14:m>
+                  <m:oMath xmlns:m="http://schemas.openxmlformats.org/officeDocument/2006/math">
+                    <m:r>
+                      <a:rPr lang="en-US" sz="2400" b="0" i="1">
+                        <a:latin typeface="Cambria Math" panose="02040503050406030204" pitchFamily="18" charset="0"/>
+                      </a:rPr>
+                      <m:t>𝑔</m:t>
+                    </m:r>
+                    <m:r>
+                      <a:rPr lang="en-US" sz="2400" b="0" i="1">
+                        <a:latin typeface="Cambria Math" panose="02040503050406030204" pitchFamily="18" charset="0"/>
+                      </a:rPr>
+                      <m:t>01 →</m:t>
+                    </m:r>
+                    <m:r>
+                      <a:rPr lang="en-US" sz="2400" b="0" i="1">
+                        <a:latin typeface="Cambria Math" panose="02040503050406030204" pitchFamily="18" charset="0"/>
+                      </a:rPr>
+                      <m:t>𝑔</m:t>
+                    </m:r>
+                    <m:r>
+                      <a:rPr lang="en-US" sz="2400" b="0" i="1">
+                        <a:latin typeface="Cambria Math" panose="02040503050406030204" pitchFamily="18" charset="0"/>
+                      </a:rPr>
+                      <m:t>10 </m:t>
+                    </m:r>
+                  </m:oMath>
+                </a14:m>
+                <a:r>
+                  <a:rPr lang="en-US" sz="2400" dirty="0" smtClean="0"/>
+                  <a:t>and   </a:t>
+                </a:r>
+                <a14:m>
+                  <m:oMath xmlns:m="http://schemas.openxmlformats.org/officeDocument/2006/math">
+                    <m:r>
+                      <a:rPr lang="en-US" sz="2400" b="0" i="1">
+                        <a:latin typeface="Cambria Math" panose="02040503050406030204" pitchFamily="18" charset="0"/>
+                      </a:rPr>
+                      <m:t>𝑔</m:t>
+                    </m:r>
+                    <m:r>
+                      <a:rPr lang="en-US" sz="2400" b="0" i="1">
+                        <a:latin typeface="Cambria Math" panose="02040503050406030204" pitchFamily="18" charset="0"/>
+                      </a:rPr>
+                      <m:t>02 →</m:t>
+                    </m:r>
+                    <m:r>
+                      <a:rPr lang="en-US" sz="2400" b="0" i="1">
+                        <a:latin typeface="Cambria Math" panose="02040503050406030204" pitchFamily="18" charset="0"/>
+                      </a:rPr>
+                      <m:t>𝑔</m:t>
+                    </m:r>
+                    <m:r>
+                      <a:rPr lang="en-US" sz="2400" b="0" i="1">
+                        <a:latin typeface="Cambria Math" panose="02040503050406030204" pitchFamily="18" charset="0"/>
+                      </a:rPr>
+                      <m:t>2</m:t>
+                    </m:r>
+                    <m:r>
+                      <a:rPr lang="en-US" sz="2400" b="0" i="1">
+                        <a:latin typeface="Cambria Math" panose="02040503050406030204" pitchFamily="18" charset="0"/>
+                      </a:rPr>
+                      <m:t>0</m:t>
+                    </m:r>
+                  </m:oMath>
+                </a14:m>
+                <a:endParaRPr lang="en-US" sz="2400" dirty="0" smtClean="0"/>
+              </a:p>
+              <a:p>
+                <a:pPr marL="342900" indent="-342900">
+                  <a:buFont typeface="Arial" panose="020B0604020202020204" pitchFamily="34" charset="0"/>
+                  <a:buChar char="•"/>
+                </a:pPr>
+                <a:endParaRPr lang="en-US" sz="2400" b="1" dirty="0" smtClean="0"/>
+              </a:p>
+              <a:p>
+                <a:pPr marL="342900" indent="-342900">
+                  <a:buFont typeface="Arial" panose="020B0604020202020204" pitchFamily="34" charset="0"/>
+                  <a:buChar char="•"/>
+                </a:pPr>
+                <a:r>
+                  <a:rPr lang="en-US" sz="2400" b="1" dirty="0" err="1" smtClean="0"/>
+                  <a:t>Qutip</a:t>
+                </a:r>
+                <a:r>
+                  <a:rPr lang="en-US" sz="2400" b="1" dirty="0" smtClean="0"/>
+                  <a:t> Simulation </a:t>
+                </a:r>
+                <a:r>
+                  <a:rPr lang="en-US" sz="2400" dirty="0" smtClean="0"/>
+                  <a:t>of </a:t>
+                </a:r>
+                <a14:m>
+                  <m:oMath xmlns:m="http://schemas.openxmlformats.org/officeDocument/2006/math">
+                    <m:r>
+                      <a:rPr lang="en-US" sz="3200" b="0" i="1" smtClean="0">
+                        <a:solidFill>
+                          <a:schemeClr val="accent6">
+                            <a:lumMod val="75000"/>
+                          </a:schemeClr>
+                        </a:solidFill>
+                        <a:latin typeface="Cambria Math" panose="02040503050406030204" pitchFamily="18" charset="0"/>
+                      </a:rPr>
+                      <m:t>𝑔</m:t>
+                    </m:r>
+                    <m:r>
+                      <a:rPr lang="en-US" sz="3200" b="0" i="1" smtClean="0">
+                        <a:solidFill>
+                          <a:schemeClr val="accent6">
+                            <a:lumMod val="75000"/>
+                          </a:schemeClr>
+                        </a:solidFill>
+                        <a:latin typeface="Cambria Math" panose="02040503050406030204" pitchFamily="18" charset="0"/>
+                      </a:rPr>
+                      <m:t>02 →</m:t>
+                    </m:r>
+                    <m:r>
+                      <a:rPr lang="en-US" sz="3200" b="0" i="1" smtClean="0">
+                        <a:solidFill>
+                          <a:srgbClr val="C10B9A"/>
+                        </a:solidFill>
+                        <a:latin typeface="Cambria Math" panose="02040503050406030204" pitchFamily="18" charset="0"/>
+                      </a:rPr>
+                      <m:t>𝑔</m:t>
+                    </m:r>
+                    <m:r>
+                      <a:rPr lang="en-US" sz="3200" b="0" i="1" smtClean="0">
+                        <a:solidFill>
+                          <a:srgbClr val="C10B9A"/>
+                        </a:solidFill>
+                        <a:latin typeface="Cambria Math" panose="02040503050406030204" pitchFamily="18" charset="0"/>
+                      </a:rPr>
+                      <m:t>20 </m:t>
+                    </m:r>
+                  </m:oMath>
+                </a14:m>
+                <a:endParaRPr lang="en-US" sz="3200" dirty="0"/>
+              </a:p>
+            </p:txBody>
+          </p:sp>
+        </mc:Choice>
+        <mc:Fallback>
+          <p:sp>
+            <p:nvSpPr>
+              <p:cNvPr id="7" name="Rectangle 6"/>
+              <p:cNvSpPr>
+                <a:spLocks noRot="1" noChangeAspect="1" noMove="1" noResize="1" noEditPoints="1" noAdjustHandles="1" noChangeArrowheads="1" noChangeShapeType="1" noTextEdit="1"/>
+              </p:cNvSpPr>
+              <p:nvPr/>
+            </p:nvSpPr>
+            <p:spPr>
+              <a:xfrm>
+                <a:off x="811132" y="2473850"/>
+                <a:ext cx="3038974" cy="2800767"/>
+              </a:xfrm>
+              <a:prstGeom prst="rect">
+                <a:avLst/>
+              </a:prstGeom>
+              <a:blipFill rotWithShape="0">
+                <a:blip r:embed="rId2"/>
+                <a:stretch>
+                  <a:fillRect l="-2605" t="-1743" r="-3808"/>
+                </a:stretch>
+              </a:blipFill>
+            </p:spPr>
+            <p:txBody>
+              <a:bodyPr/>
+              <a:lstStyle/>
+              <a:p>
+                <a:r>
+                  <a:rPr lang="en-US">
+                    <a:noFill/>
+                  </a:rPr>
+                  <a:t> </a:t>
+                </a:r>
+              </a:p>
+            </p:txBody>
+          </p:sp>
+        </mc:Fallback>
+      </mc:AlternateContent>
+      <p:pic>
+        <p:nvPicPr>
+          <p:cNvPr id="3" name="Picture 2"/>
+          <p:cNvPicPr>
+            <a:picLocks noChangeAspect="1"/>
+          </p:cNvPicPr>
+          <p:nvPr/>
+        </p:nvPicPr>
+        <p:blipFill>
+          <a:blip r:embed="rId3" cstate="print">
+            <a:extLst>
+              <a:ext uri="{28A0092B-C50C-407E-A947-70E740481C1C}">
+                <a14:useLocalDpi xmlns:a14="http://schemas.microsoft.com/office/drawing/2010/main" val="0"/>
+              </a:ext>
+            </a:extLst>
+          </a:blip>
+          <a:stretch>
+            <a:fillRect/>
+          </a:stretch>
+        </p:blipFill>
+        <p:spPr>
+          <a:xfrm>
+            <a:off x="4788568" y="1350745"/>
+            <a:ext cx="6989344" cy="5591476"/>
+          </a:xfrm>
+          <a:prstGeom prst="rect">
+            <a:avLst/>
+          </a:prstGeom>
+        </p:spPr>
+      </p:pic>
+    </p:spTree>
+    <p:extLst>
+      <p:ext uri="{BB962C8B-B14F-4D97-AF65-F5344CB8AC3E}">
+        <p14:creationId xmlns:p14="http://schemas.microsoft.com/office/powerpoint/2010/main" val="214687751"/>
+      </p:ext>
+    </p:extLst>
+  </p:cSld>
+  <p:clrMapOvr>
+    <a:masterClrMapping/>
+  </p:clrMapOvr>
+  <p:timing>
+    <p:tnLst>
+      <p:par>
+        <p:cTn id="1" dur="indefinite" restart="never" nodeType="tmRoot"/>
+      </p:par>
+    </p:tnLst>
+  </p:timing>
+</p:sld>
+</file>
+
+<file path=ppt/slides/slide19.xml><?xml version="1.0" encoding="utf-8"?>
+<p:sld xmlns:a="http://schemas.openxmlformats.org/drawingml/2006/main" xmlns:r="http://schemas.openxmlformats.org/officeDocument/2006/relationships" xmlns:p="http://schemas.openxmlformats.org/presentationml/2006/main">
+  <p:cSld>
+    <p:spTree>
+      <p:nvGrpSpPr>
+        <p:cNvPr id="1" name=""/>
+        <p:cNvGrpSpPr/>
+        <p:nvPr/>
+      </p:nvGrpSpPr>
+      <p:grpSpPr>
+        <a:xfrm>
+          <a:off x="0" y="0"/>
+          <a:ext cx="0" cy="0"/>
+          <a:chOff x="0" y="0"/>
+          <a:chExt cx="0" cy="0"/>
+        </a:xfrm>
+      </p:grpSpPr>
+      <p:sp>
+        <p:nvSpPr>
+          <p:cNvPr id="2" name="Title 1"/>
+          <p:cNvSpPr>
+            <a:spLocks noGrp="1"/>
+          </p:cNvSpPr>
+          <p:nvPr>
+            <p:ph type="title"/>
+          </p:nvPr>
+        </p:nvSpPr>
+        <p:spPr/>
+        <p:txBody>
+          <a:bodyPr/>
+          <a:lstStyle/>
+          <a:p>
+            <a:r>
+              <a:rPr lang="en-US" dirty="0"/>
+              <a:t>Two Mode ECD: Simultaneous State Transfer</a:t>
+            </a:r>
+          </a:p>
+        </p:txBody>
+      </p:sp>
+      <mc:AlternateContent xmlns:mc="http://schemas.openxmlformats.org/markup-compatibility/2006">
+        <mc:Choice xmlns:a14="http://schemas.microsoft.com/office/drawing/2010/main" Requires="a14">
+          <p:sp>
+            <p:nvSpPr>
+              <p:cNvPr id="7" name="Rectangle 6"/>
+              <p:cNvSpPr/>
+              <p:nvPr/>
+            </p:nvSpPr>
+            <p:spPr>
+              <a:xfrm>
+                <a:off x="811132" y="2473850"/>
+                <a:ext cx="3038974" cy="3600986"/>
+              </a:xfrm>
+              <a:prstGeom prst="rect">
+                <a:avLst/>
+              </a:prstGeom>
+            </p:spPr>
+            <p:txBody>
+              <a:bodyPr wrap="square">
+                <a:spAutoFit/>
+              </a:bodyPr>
+              <a:lstStyle/>
+              <a:p>
+                <a:pPr marL="342900" indent="-342900">
+                  <a:buFont typeface="Arial" panose="020B0604020202020204" pitchFamily="34" charset="0"/>
+                  <a:buChar char="•"/>
+                </a:pPr>
+                <a:r>
+                  <a:rPr lang="en-US" sz="2400" b="1" dirty="0" smtClean="0">
+                    <a:latin typeface="Cambria Math" panose="02040503050406030204" pitchFamily="18" charset="0"/>
+                  </a:rPr>
+                  <a:t>Parameters Optimized </a:t>
+                </a:r>
+                <a:r>
+                  <a:rPr lang="en-US" sz="2400" dirty="0" smtClean="0">
+                    <a:latin typeface="Cambria Math" panose="02040503050406030204" pitchFamily="18" charset="0"/>
+                  </a:rPr>
+                  <a:t>for both </a:t>
+                </a:r>
+                <a14:m>
+                  <m:oMath xmlns:m="http://schemas.openxmlformats.org/officeDocument/2006/math">
+                    <m:r>
+                      <a:rPr lang="en-US" sz="2400" b="0" i="1">
+                        <a:latin typeface="Cambria Math" panose="02040503050406030204" pitchFamily="18" charset="0"/>
+                      </a:rPr>
+                      <m:t>𝑔</m:t>
+                    </m:r>
+                    <m:r>
+                      <a:rPr lang="en-US" sz="2400" b="0" i="1">
+                        <a:latin typeface="Cambria Math" panose="02040503050406030204" pitchFamily="18" charset="0"/>
+                      </a:rPr>
+                      <m:t>01 →</m:t>
+                    </m:r>
+                    <m:r>
+                      <a:rPr lang="en-US" sz="2400" b="0" i="1">
+                        <a:latin typeface="Cambria Math" panose="02040503050406030204" pitchFamily="18" charset="0"/>
+                      </a:rPr>
+                      <m:t>𝑔</m:t>
+                    </m:r>
+                    <m:r>
+                      <a:rPr lang="en-US" sz="2400" b="0" i="1">
+                        <a:latin typeface="Cambria Math" panose="02040503050406030204" pitchFamily="18" charset="0"/>
+                      </a:rPr>
+                      <m:t>10 </m:t>
+                    </m:r>
+                  </m:oMath>
+                </a14:m>
+                <a:r>
+                  <a:rPr lang="en-US" sz="2400" dirty="0" smtClean="0"/>
+                  <a:t>and   </a:t>
+                </a:r>
+                <a14:m>
+                  <m:oMath xmlns:m="http://schemas.openxmlformats.org/officeDocument/2006/math">
+                    <m:r>
+                      <a:rPr lang="en-US" sz="2400" b="0" i="1">
+                        <a:latin typeface="Cambria Math" panose="02040503050406030204" pitchFamily="18" charset="0"/>
+                      </a:rPr>
+                      <m:t>𝑔</m:t>
+                    </m:r>
+                    <m:r>
+                      <a:rPr lang="en-US" sz="2400" b="0" i="1">
+                        <a:latin typeface="Cambria Math" panose="02040503050406030204" pitchFamily="18" charset="0"/>
+                      </a:rPr>
+                      <m:t>02 →</m:t>
+                    </m:r>
+                    <m:r>
+                      <a:rPr lang="en-US" sz="2400" b="0" i="1">
+                        <a:latin typeface="Cambria Math" panose="02040503050406030204" pitchFamily="18" charset="0"/>
+                      </a:rPr>
+                      <m:t>𝑔</m:t>
+                    </m:r>
+                    <m:r>
+                      <a:rPr lang="en-US" sz="2400" b="0" i="1">
+                        <a:latin typeface="Cambria Math" panose="02040503050406030204" pitchFamily="18" charset="0"/>
+                      </a:rPr>
+                      <m:t>2</m:t>
+                    </m:r>
+                    <m:r>
+                      <a:rPr lang="en-US" sz="2400" b="0" i="1">
+                        <a:latin typeface="Cambria Math" panose="02040503050406030204" pitchFamily="18" charset="0"/>
+                      </a:rPr>
+                      <m:t>0</m:t>
+                    </m:r>
+                  </m:oMath>
+                </a14:m>
+                <a:endParaRPr lang="en-US" sz="2400" dirty="0" smtClean="0"/>
+              </a:p>
+              <a:p>
+                <a:pPr marL="342900" indent="-342900">
+                  <a:buFont typeface="Arial" panose="020B0604020202020204" pitchFamily="34" charset="0"/>
+                  <a:buChar char="•"/>
+                </a:pPr>
+                <a:endParaRPr lang="en-US" sz="2400" b="1" dirty="0" smtClean="0"/>
+              </a:p>
+              <a:p>
+                <a:pPr marL="342900" indent="-342900">
+                  <a:buFont typeface="Arial" panose="020B0604020202020204" pitchFamily="34" charset="0"/>
+                  <a:buChar char="•"/>
+                </a:pPr>
+                <a:r>
+                  <a:rPr lang="en-US" sz="2400" b="1" dirty="0" err="1" smtClean="0"/>
+                  <a:t>Qutip</a:t>
+                </a:r>
+                <a:r>
+                  <a:rPr lang="en-US" sz="2400" b="1" dirty="0" smtClean="0"/>
+                  <a:t> Simulation </a:t>
+                </a:r>
+                <a:r>
+                  <a:rPr lang="en-US" sz="2400" dirty="0" smtClean="0"/>
+                  <a:t>of</a:t>
+                </a:r>
+                <a:endParaRPr lang="en-US" sz="2400" i="1" dirty="0" smtClean="0">
+                  <a:solidFill>
+                    <a:schemeClr val="accent6">
+                      <a:lumMod val="75000"/>
+                    </a:schemeClr>
+                  </a:solidFill>
+                  <a:latin typeface="Cambria Math" panose="02040503050406030204" pitchFamily="18" charset="0"/>
+                </a:endParaRPr>
+              </a:p>
+              <a:p>
+                <a14:m>
+                  <m:oMathPara xmlns:m="http://schemas.openxmlformats.org/officeDocument/2006/math">
+                    <m:oMathParaPr>
+                      <m:jc m:val="centerGroup"/>
+                    </m:oMathParaPr>
+                    <m:oMath xmlns:m="http://schemas.openxmlformats.org/officeDocument/2006/math">
+                      <m:d>
+                        <m:dPr>
+                          <m:ctrlPr>
+                            <a:rPr lang="en-US" sz="2800" b="0" i="1" smtClean="0">
+                              <a:solidFill>
+                                <a:schemeClr val="accent6">
+                                  <a:lumMod val="75000"/>
+                                </a:schemeClr>
+                              </a:solidFill>
+                              <a:latin typeface="Cambria Math" panose="02040503050406030204" pitchFamily="18" charset="0"/>
+                            </a:rPr>
+                          </m:ctrlPr>
+                        </m:dPr>
+                        <m:e>
+                          <m:r>
+                            <a:rPr lang="en-US" sz="2800" i="1" smtClean="0">
+                              <a:solidFill>
+                                <a:schemeClr val="accent2">
+                                  <a:lumMod val="75000"/>
+                                </a:schemeClr>
+                              </a:solidFill>
+                              <a:latin typeface="Cambria Math" panose="02040503050406030204" pitchFamily="18" charset="0"/>
+                            </a:rPr>
+                            <m:t>𝑔</m:t>
+                          </m:r>
+                          <m:r>
+                            <a:rPr lang="en-US" sz="2800" i="1" smtClean="0">
+                              <a:solidFill>
+                                <a:schemeClr val="accent2">
+                                  <a:lumMod val="75000"/>
+                                </a:schemeClr>
+                              </a:solidFill>
+                              <a:latin typeface="Cambria Math" panose="02040503050406030204" pitchFamily="18" charset="0"/>
+                            </a:rPr>
+                            <m:t>01+ </m:t>
+                          </m:r>
+                          <m:r>
+                            <a:rPr lang="en-US" sz="2800" b="0" i="1" smtClean="0">
+                              <a:solidFill>
+                                <a:schemeClr val="accent6">
+                                  <a:lumMod val="75000"/>
+                                </a:schemeClr>
+                              </a:solidFill>
+                              <a:latin typeface="Cambria Math" panose="02040503050406030204" pitchFamily="18" charset="0"/>
+                            </a:rPr>
+                            <m:t>𝑔</m:t>
+                          </m:r>
+                          <m:r>
+                            <a:rPr lang="en-US" sz="2800" b="0" i="1" smtClean="0">
+                              <a:solidFill>
+                                <a:schemeClr val="accent6">
+                                  <a:lumMod val="75000"/>
+                                </a:schemeClr>
+                              </a:solidFill>
+                              <a:latin typeface="Cambria Math" panose="02040503050406030204" pitchFamily="18" charset="0"/>
+                            </a:rPr>
+                            <m:t>02</m:t>
+                          </m:r>
+                        </m:e>
+                      </m:d>
+                    </m:oMath>
+                  </m:oMathPara>
+                </a14:m>
+                <a:endParaRPr lang="en-US" sz="2800" b="0" i="1" dirty="0" smtClean="0">
+                  <a:solidFill>
+                    <a:schemeClr val="accent6">
+                      <a:lumMod val="75000"/>
+                    </a:schemeClr>
+                  </a:solidFill>
+                  <a:latin typeface="Cambria Math" panose="02040503050406030204" pitchFamily="18" charset="0"/>
+                </a:endParaRPr>
+              </a:p>
+              <a:p>
+                <a14:m>
+                  <m:oMathPara xmlns:m="http://schemas.openxmlformats.org/officeDocument/2006/math">
+                    <m:oMathParaPr>
+                      <m:jc m:val="centerGroup"/>
+                    </m:oMathParaPr>
+                    <m:oMath xmlns:m="http://schemas.openxmlformats.org/officeDocument/2006/math">
+                      <m:r>
+                        <a:rPr lang="en-US" sz="2800" b="0" i="1" smtClean="0">
+                          <a:solidFill>
+                            <a:schemeClr val="tx1"/>
+                          </a:solidFill>
+                          <a:latin typeface="Cambria Math" panose="02040503050406030204" pitchFamily="18" charset="0"/>
+                        </a:rPr>
+                        <m:t>↓</m:t>
+                      </m:r>
+                    </m:oMath>
+                  </m:oMathPara>
+                </a14:m>
+                <a:endParaRPr lang="en-US" sz="2800" b="0" i="1" dirty="0" smtClean="0">
+                  <a:solidFill>
+                    <a:schemeClr val="tx1"/>
+                  </a:solidFill>
+                  <a:latin typeface="Cambria Math" panose="02040503050406030204" pitchFamily="18" charset="0"/>
+                </a:endParaRPr>
+              </a:p>
+              <a:p>
+                <a14:m>
+                  <m:oMathPara xmlns:m="http://schemas.openxmlformats.org/officeDocument/2006/math">
+                    <m:oMathParaPr>
+                      <m:jc m:val="centerGroup"/>
+                    </m:oMathParaPr>
+                    <m:oMath xmlns:m="http://schemas.openxmlformats.org/officeDocument/2006/math">
+                      <m:r>
+                        <a:rPr lang="en-US" sz="2800" b="0" i="1" smtClean="0">
+                          <a:solidFill>
+                            <a:schemeClr val="tx1"/>
+                          </a:solidFill>
+                          <a:latin typeface="Cambria Math" panose="02040503050406030204" pitchFamily="18" charset="0"/>
+                        </a:rPr>
+                        <m:t>(</m:t>
+                      </m:r>
+                      <m:r>
+                        <a:rPr lang="en-US" sz="2800" b="0" i="1" smtClean="0">
+                          <a:solidFill>
+                            <a:srgbClr val="C51907"/>
+                          </a:solidFill>
+                          <a:latin typeface="Cambria Math" panose="02040503050406030204" pitchFamily="18" charset="0"/>
+                        </a:rPr>
+                        <m:t>𝑔</m:t>
+                      </m:r>
+                      <m:r>
+                        <a:rPr lang="en-US" sz="2800" b="0" i="1" smtClean="0">
+                          <a:solidFill>
+                            <a:srgbClr val="C51907"/>
+                          </a:solidFill>
+                          <a:latin typeface="Cambria Math" panose="02040503050406030204" pitchFamily="18" charset="0"/>
+                        </a:rPr>
+                        <m:t>10+ </m:t>
+                      </m:r>
+                      <m:r>
+                        <a:rPr lang="en-US" sz="2800" b="0" i="1" smtClean="0">
+                          <a:solidFill>
+                            <a:srgbClr val="C10B9A"/>
+                          </a:solidFill>
+                          <a:latin typeface="Cambria Math" panose="02040503050406030204" pitchFamily="18" charset="0"/>
+                        </a:rPr>
+                        <m:t>𝑔</m:t>
+                      </m:r>
+                      <m:r>
+                        <a:rPr lang="en-US" sz="2800" b="0" i="1" smtClean="0">
+                          <a:solidFill>
+                            <a:srgbClr val="C10B9A"/>
+                          </a:solidFill>
+                          <a:latin typeface="Cambria Math" panose="02040503050406030204" pitchFamily="18" charset="0"/>
+                        </a:rPr>
+                        <m:t>20)  </m:t>
+                      </m:r>
+                    </m:oMath>
+                  </m:oMathPara>
+                </a14:m>
+                <a:endParaRPr lang="en-US" sz="3600" dirty="0"/>
+              </a:p>
+            </p:txBody>
+          </p:sp>
+        </mc:Choice>
+        <mc:Fallback>
+          <p:sp>
+            <p:nvSpPr>
+              <p:cNvPr id="7" name="Rectangle 6"/>
+              <p:cNvSpPr>
+                <a:spLocks noRot="1" noChangeAspect="1" noMove="1" noResize="1" noEditPoints="1" noAdjustHandles="1" noChangeArrowheads="1" noChangeShapeType="1" noTextEdit="1"/>
+              </p:cNvSpPr>
+              <p:nvPr/>
+            </p:nvSpPr>
+            <p:spPr>
+              <a:xfrm>
+                <a:off x="811132" y="2473850"/>
+                <a:ext cx="3038974" cy="3600986"/>
+              </a:xfrm>
+              <a:prstGeom prst="rect">
+                <a:avLst/>
+              </a:prstGeom>
+              <a:blipFill rotWithShape="0">
+                <a:blip r:embed="rId2"/>
+                <a:stretch>
+                  <a:fillRect l="-2605" t="-1354" r="-2806"/>
+                </a:stretch>
+              </a:blipFill>
+            </p:spPr>
+            <p:txBody>
+              <a:bodyPr/>
+              <a:lstStyle/>
+              <a:p>
+                <a:r>
+                  <a:rPr lang="en-US">
+                    <a:noFill/>
+                  </a:rPr>
+                  <a:t> </a:t>
+                </a:r>
+              </a:p>
+            </p:txBody>
+          </p:sp>
+        </mc:Fallback>
+      </mc:AlternateContent>
+      <p:pic>
+        <p:nvPicPr>
+          <p:cNvPr id="4" name="Picture 3"/>
+          <p:cNvPicPr>
+            <a:picLocks noChangeAspect="1"/>
+          </p:cNvPicPr>
+          <p:nvPr/>
+        </p:nvPicPr>
+        <p:blipFill>
+          <a:blip r:embed="rId3" cstate="print">
+            <a:extLst>
+              <a:ext uri="{28A0092B-C50C-407E-A947-70E740481C1C}">
+                <a14:useLocalDpi xmlns:a14="http://schemas.microsoft.com/office/drawing/2010/main" val="0"/>
+              </a:ext>
+            </a:extLst>
+          </a:blip>
+          <a:stretch>
+            <a:fillRect/>
+          </a:stretch>
+        </p:blipFill>
+        <p:spPr>
+          <a:xfrm>
+            <a:off x="5173578" y="1353151"/>
+            <a:ext cx="6881060" cy="5504849"/>
+          </a:xfrm>
+          <a:prstGeom prst="rect">
+            <a:avLst/>
+          </a:prstGeom>
+        </p:spPr>
+      </p:pic>
+    </p:spTree>
+    <p:extLst>
+      <p:ext uri="{BB962C8B-B14F-4D97-AF65-F5344CB8AC3E}">
+        <p14:creationId xmlns:p14="http://schemas.microsoft.com/office/powerpoint/2010/main" val="2207069377"/>
+      </p:ext>
+    </p:extLst>
+  </p:cSld>
+  <p:clrMapOvr>
+    <a:masterClrMapping/>
+  </p:clrMapOvr>
+  <p:timing>
+    <p:tnLst>
+      <p:par>
+        <p:cTn id="1" dur="indefinite" restart="never" nodeType="tmRoot"/>
+      </p:par>
+    </p:tnLst>
+  </p:timing>
+</p:sld>
+</file>
+
+<file path=ppt/slides/slide2.xml><?xml version="1.0" encoding="utf-8"?>
+<p:sld xmlns:a="http://schemas.openxmlformats.org/drawingml/2006/main" xmlns:r="http://schemas.openxmlformats.org/officeDocument/2006/relationships" xmlns:p="http://schemas.openxmlformats.org/presentationml/2006/main">
+  <p:cSld>
+    <p:spTree>
+      <p:nvGrpSpPr>
+        <p:cNvPr id="1" name=""/>
+        <p:cNvGrpSpPr/>
+        <p:nvPr/>
+      </p:nvGrpSpPr>
+      <p:grpSpPr>
+        <a:xfrm>
+          <a:off x="0" y="0"/>
+          <a:ext cx="0" cy="0"/>
+          <a:chOff x="0" y="0"/>
+          <a:chExt cx="0" cy="0"/>
+        </a:xfrm>
+      </p:grpSpPr>
+      <p:sp>
+        <p:nvSpPr>
+          <p:cNvPr id="2" name="Title 1"/>
+          <p:cNvSpPr>
+            <a:spLocks noGrp="1"/>
+          </p:cNvSpPr>
+          <p:nvPr>
+            <p:ph type="title"/>
+          </p:nvPr>
+        </p:nvSpPr>
+        <p:spPr/>
+        <p:txBody>
+          <a:bodyPr/>
+          <a:lstStyle/>
+          <a:p>
+            <a:r>
+              <a:rPr lang="en-US" dirty="0" smtClean="0"/>
+              <a:t>Motivation</a:t>
+            </a:r>
+            <a:endParaRPr lang="en-US" dirty="0"/>
+          </a:p>
+        </p:txBody>
+      </p:sp>
+      <mc:AlternateContent xmlns:mc="http://schemas.openxmlformats.org/markup-compatibility/2006" xmlns:a14="http://schemas.microsoft.com/office/drawing/2010/main">
+        <mc:Choice Requires="a14">
+          <p:sp>
+            <p:nvSpPr>
+              <p:cNvPr id="3" name="Content Placeholder 2"/>
+              <p:cNvSpPr>
+                <a:spLocks noGrp="1"/>
+              </p:cNvSpPr>
+              <p:nvPr>
+                <p:ph idx="1"/>
+              </p:nvPr>
+            </p:nvSpPr>
+            <p:spPr/>
+            <p:txBody>
+              <a:bodyPr/>
+              <a:lstStyle/>
+              <a:p>
+                <a:pPr lvl="1"/>
+                <a:r>
+                  <a:rPr lang="en-US" sz="3200" dirty="0" smtClean="0"/>
+                  <a:t>SNAP Gates take time </a:t>
+                </a:r>
+                <a14:m>
+                  <m:oMath xmlns:m="http://schemas.openxmlformats.org/officeDocument/2006/math">
+                    <m:r>
+                      <a:rPr lang="en-US" sz="3200" i="1">
+                        <a:latin typeface="Cambria Math" panose="02040503050406030204" pitchFamily="18" charset="0"/>
+                      </a:rPr>
+                      <m:t>≈2</m:t>
+                    </m:r>
+                    <m:r>
+                      <a:rPr lang="en-US" sz="3200" i="1">
+                        <a:latin typeface="Cambria Math" panose="02040503050406030204" pitchFamily="18" charset="0"/>
+                      </a:rPr>
+                      <m:t>𝜋</m:t>
+                    </m:r>
+                    <m:r>
+                      <a:rPr lang="en-US" sz="3200" i="1">
+                        <a:latin typeface="Cambria Math" panose="02040503050406030204" pitchFamily="18" charset="0"/>
+                      </a:rPr>
+                      <m:t>/</m:t>
+                    </m:r>
+                    <m:r>
+                      <a:rPr lang="en-US" sz="3200" i="1">
+                        <a:latin typeface="Cambria Math" panose="02040503050406030204" pitchFamily="18" charset="0"/>
+                      </a:rPr>
+                      <m:t>𝜒</m:t>
+                    </m:r>
+                  </m:oMath>
+                </a14:m>
+                <a:r>
+                  <a:rPr lang="en-US" sz="3200" dirty="0"/>
+                  <a:t> where </a:t>
+                </a:r>
+                <a14:m>
+                  <m:oMath xmlns:m="http://schemas.openxmlformats.org/officeDocument/2006/math">
+                    <m:r>
+                      <a:rPr lang="en-US" sz="3200" i="1">
+                        <a:latin typeface="Cambria Math" panose="02040503050406030204" pitchFamily="18" charset="0"/>
+                      </a:rPr>
+                      <m:t>𝜒</m:t>
+                    </m:r>
+                    <m:r>
+                      <a:rPr lang="en-US" sz="3200" b="0" i="1" smtClean="0">
+                        <a:latin typeface="Cambria Math" panose="02040503050406030204" pitchFamily="18" charset="0"/>
+                      </a:rPr>
+                      <m:t>≈</m:t>
+                    </m:r>
+                  </m:oMath>
+                </a14:m>
+                <a:r>
+                  <a:rPr lang="en-US" sz="3200" dirty="0" smtClean="0"/>
+                  <a:t> MHz </a:t>
+                </a:r>
+                <a:r>
+                  <a:rPr lang="en-US" sz="3200" dirty="0"/>
+                  <a:t>is dispersive coupling strength.</a:t>
+                </a:r>
+              </a:p>
+              <a:p>
+                <a:pPr lvl="1"/>
+                <a:r>
+                  <a:rPr lang="en-US" sz="3200" dirty="0"/>
+                  <a:t>Reducing Gate time </a:t>
+                </a:r>
+                <a14:m>
+                  <m:oMath xmlns:m="http://schemas.openxmlformats.org/officeDocument/2006/math">
+                    <m:r>
+                      <a:rPr lang="en-US" sz="3200" i="1">
+                        <a:latin typeface="Cambria Math" panose="02040503050406030204" pitchFamily="18" charset="0"/>
+                      </a:rPr>
+                      <m:t>→ </m:t>
+                    </m:r>
+                  </m:oMath>
+                </a14:m>
+                <a:r>
+                  <a:rPr lang="en-US" sz="3200" dirty="0"/>
+                  <a:t>Increasing </a:t>
+                </a:r>
+                <a14:m>
+                  <m:oMath xmlns:m="http://schemas.openxmlformats.org/officeDocument/2006/math">
+                    <m:r>
+                      <a:rPr lang="en-US" sz="3200" i="1">
+                        <a:latin typeface="Cambria Math" panose="02040503050406030204" pitchFamily="18" charset="0"/>
+                      </a:rPr>
+                      <m:t>𝜒</m:t>
+                    </m:r>
+                  </m:oMath>
+                </a14:m>
+                <a:r>
+                  <a:rPr lang="en-US" sz="3200" dirty="0"/>
+                  <a:t> </a:t>
+                </a:r>
+                <a14:m>
+                  <m:oMath xmlns:m="http://schemas.openxmlformats.org/officeDocument/2006/math">
+                    <m:r>
+                      <a:rPr lang="en-US" sz="3200" i="1">
+                        <a:latin typeface="Cambria Math" panose="02040503050406030204" pitchFamily="18" charset="0"/>
+                      </a:rPr>
+                      <m:t>→</m:t>
+                    </m:r>
+                  </m:oMath>
+                </a14:m>
+                <a:r>
+                  <a:rPr lang="en-US" sz="3200" dirty="0"/>
+                  <a:t>Reducing lifetime of cavity</a:t>
+                </a:r>
+              </a:p>
+              <a:p>
+                <a:pPr lvl="1"/>
+                <a:r>
+                  <a:rPr lang="en-US" sz="3200" dirty="0"/>
+                  <a:t>ECD Idea: Keep </a:t>
+                </a:r>
+                <a14:m>
+                  <m:oMath xmlns:m="http://schemas.openxmlformats.org/officeDocument/2006/math">
+                    <m:r>
+                      <a:rPr lang="en-US" sz="3200" i="1">
+                        <a:latin typeface="Cambria Math" panose="02040503050406030204" pitchFamily="18" charset="0"/>
+                      </a:rPr>
+                      <m:t>𝜒</m:t>
+                    </m:r>
+                    <m:r>
+                      <a:rPr lang="en-US" sz="3200" b="0" i="1" smtClean="0">
+                        <a:latin typeface="Cambria Math" panose="02040503050406030204" pitchFamily="18" charset="0"/>
+                      </a:rPr>
+                      <m:t>≈10</m:t>
+                    </m:r>
+                  </m:oMath>
+                </a14:m>
+                <a:r>
+                  <a:rPr lang="en-US" sz="3200" dirty="0" smtClean="0"/>
+                  <a:t> kHz small; </a:t>
+                </a:r>
+                <a:r>
+                  <a:rPr lang="en-US" sz="3200" dirty="0"/>
+                  <a:t>But enhance it by displacing cavity (</a:t>
+                </a:r>
+                <a14:m>
+                  <m:oMath xmlns:m="http://schemas.openxmlformats.org/officeDocument/2006/math">
+                    <m:sSub>
+                      <m:sSubPr>
+                        <m:ctrlPr>
+                          <a:rPr lang="en-US" sz="3200" i="1">
+                            <a:latin typeface="Cambria Math" panose="02040503050406030204" pitchFamily="18" charset="0"/>
+                          </a:rPr>
+                        </m:ctrlPr>
+                      </m:sSubPr>
+                      <m:e>
+                        <m:r>
+                          <a:rPr lang="en-US" sz="3200" i="1">
+                            <a:latin typeface="Cambria Math" panose="02040503050406030204" pitchFamily="18" charset="0"/>
+                          </a:rPr>
+                          <m:t>𝛼</m:t>
+                        </m:r>
+                      </m:e>
+                      <m:sub>
+                        <m:r>
+                          <a:rPr lang="en-US" sz="3200" i="1">
+                            <a:latin typeface="Cambria Math" panose="02040503050406030204" pitchFamily="18" charset="0"/>
+                          </a:rPr>
+                          <m:t>0</m:t>
+                        </m:r>
+                      </m:sub>
+                    </m:sSub>
+                  </m:oMath>
+                </a14:m>
+                <a:r>
+                  <a:rPr lang="en-US" sz="3200" dirty="0"/>
+                  <a:t>) far from origin</a:t>
+                </a:r>
+              </a:p>
+              <a:p>
+                <a:pPr lvl="1"/>
+                <a:r>
+                  <a:rPr lang="en-US" sz="3200" dirty="0"/>
+                  <a:t> Effective Gate time </a:t>
+                </a:r>
+                <a14:m>
+                  <m:oMath xmlns:m="http://schemas.openxmlformats.org/officeDocument/2006/math">
+                    <m:r>
+                      <a:rPr lang="en-US" sz="3200" i="1">
+                        <a:latin typeface="Cambria Math" panose="02040503050406030204" pitchFamily="18" charset="0"/>
+                      </a:rPr>
+                      <m:t>1/</m:t>
+                    </m:r>
+                    <m:r>
+                      <a:rPr lang="en-US" sz="3200" i="1">
+                        <a:latin typeface="Cambria Math" panose="02040503050406030204" pitchFamily="18" charset="0"/>
+                      </a:rPr>
+                      <m:t>𝜒</m:t>
+                    </m:r>
+                    <m:sSub>
+                      <m:sSubPr>
+                        <m:ctrlPr>
+                          <a:rPr lang="en-US" sz="3200" i="1">
+                            <a:latin typeface="Cambria Math" panose="02040503050406030204" pitchFamily="18" charset="0"/>
+                          </a:rPr>
+                        </m:ctrlPr>
+                      </m:sSubPr>
+                      <m:e>
+                        <m:r>
+                          <a:rPr lang="en-US" sz="3200" i="1">
+                            <a:latin typeface="Cambria Math" panose="02040503050406030204" pitchFamily="18" charset="0"/>
+                          </a:rPr>
+                          <m:t>𝛼</m:t>
+                        </m:r>
+                      </m:e>
+                      <m:sub>
+                        <m:r>
+                          <a:rPr lang="en-US" sz="3200" i="1">
+                            <a:latin typeface="Cambria Math" panose="02040503050406030204" pitchFamily="18" charset="0"/>
+                          </a:rPr>
+                          <m:t>0</m:t>
+                        </m:r>
+                      </m:sub>
+                    </m:sSub>
+                  </m:oMath>
+                </a14:m>
+                <a:r>
+                  <a:rPr lang="en-US" sz="3200" dirty="0"/>
+                  <a:t> where </a:t>
+                </a:r>
+                <a14:m>
+                  <m:oMath xmlns:m="http://schemas.openxmlformats.org/officeDocument/2006/math">
+                    <m:sSub>
+                      <m:sSubPr>
+                        <m:ctrlPr>
+                          <a:rPr lang="en-US" sz="3200" i="1">
+                            <a:latin typeface="Cambria Math" panose="02040503050406030204" pitchFamily="18" charset="0"/>
+                          </a:rPr>
+                        </m:ctrlPr>
+                      </m:sSubPr>
+                      <m:e>
+                        <m:r>
+                          <a:rPr lang="en-US" sz="3200" i="1">
+                            <a:latin typeface="Cambria Math" panose="02040503050406030204" pitchFamily="18" charset="0"/>
+                          </a:rPr>
+                          <m:t>𝛼</m:t>
+                        </m:r>
+                      </m:e>
+                      <m:sub>
+                        <m:r>
+                          <a:rPr lang="en-US" sz="3200" i="1">
+                            <a:latin typeface="Cambria Math" panose="02040503050406030204" pitchFamily="18" charset="0"/>
+                          </a:rPr>
+                          <m:t>0</m:t>
+                        </m:r>
+                      </m:sub>
+                    </m:sSub>
+                    <m:r>
+                      <a:rPr lang="en-US" sz="3200" i="1">
+                        <a:latin typeface="Cambria Math" panose="02040503050406030204" pitchFamily="18" charset="0"/>
+                      </a:rPr>
+                      <m:t>≫1</m:t>
+                    </m:r>
+                  </m:oMath>
+                </a14:m>
+                <a:endParaRPr lang="en-US" sz="3200" dirty="0"/>
+              </a:p>
+              <a:p>
+                <a:pPr marL="0" indent="0">
+                  <a:buNone/>
+                </a:pPr>
+                <a:endParaRPr lang="en-US" dirty="0"/>
+              </a:p>
+            </p:txBody>
+          </p:sp>
+        </mc:Choice>
+        <mc:Fallback xmlns="">
+          <p:sp>
+            <p:nvSpPr>
+              <p:cNvPr id="3" name="Content Placeholder 2"/>
+              <p:cNvSpPr>
+                <a:spLocks noGrp="1" noRot="1" noChangeAspect="1" noMove="1" noResize="1" noEditPoints="1" noAdjustHandles="1" noChangeArrowheads="1" noChangeShapeType="1" noTextEdit="1"/>
+              </p:cNvSpPr>
+              <p:nvPr>
+                <p:ph idx="1"/>
+              </p:nvPr>
+            </p:nvSpPr>
+            <p:spPr>
+              <a:blipFill rotWithShape="0">
+                <a:blip r:embed="rId2"/>
+                <a:stretch>
+                  <a:fillRect t="-2801" r="-986"/>
+                </a:stretch>
+              </a:blipFill>
+            </p:spPr>
+            <p:txBody>
+              <a:bodyPr/>
+              <a:lstStyle/>
+              <a:p>
+                <a:r>
+                  <a:rPr lang="en-US">
+                    <a:noFill/>
+                  </a:rPr>
+                  <a:t> </a:t>
+                </a:r>
+              </a:p>
+            </p:txBody>
+          </p:sp>
+        </mc:Fallback>
+      </mc:AlternateContent>
+    </p:spTree>
+    <p:extLst>
+      <p:ext uri="{BB962C8B-B14F-4D97-AF65-F5344CB8AC3E}">
+        <p14:creationId xmlns:p14="http://schemas.microsoft.com/office/powerpoint/2010/main" val="1584008509"/>
+      </p:ext>
+    </p:extLst>
+  </p:cSld>
+  <p:clrMapOvr>
+    <a:masterClrMapping/>
+  </p:clrMapOvr>
+  <p:timing>
+    <p:tnLst>
+      <p:par>
+        <p:cTn id="1" dur="indefinite" restart="never" nodeType="tmRoot"/>
+      </p:par>
+    </p:tnLst>
+  </p:timing>
+</p:sld>
+</file>
+
+<file path=ppt/slides/slide20.xml><?xml version="1.0" encoding="utf-8"?>
 <p:sld xmlns:a="http://schemas.openxmlformats.org/drawingml/2006/main" xmlns:r="http://schemas.openxmlformats.org/officeDocument/2006/relationships" xmlns:p="http://schemas.openxmlformats.org/presentationml/2006/main">
   <p:cSld>
     <p:spTree>
@@ -11333,7 +13067,7 @@
 </p:sld>
 </file>
 
-<file path=ppt/slides/slide17.xml><?xml version="1.0" encoding="utf-8"?>
+<file path=ppt/slides/slide21.xml><?xml version="1.0" encoding="utf-8"?>
 <p:sld xmlns:a="http://schemas.openxmlformats.org/drawingml/2006/main" xmlns:r="http://schemas.openxmlformats.org/officeDocument/2006/relationships" xmlns:p="http://schemas.openxmlformats.org/presentationml/2006/main">
   <p:cSld>
     <p:spTree>
@@ -11385,30 +13119,6 @@
           </a:p>
         </p:txBody>
       </p:sp>
-      <p:pic>
-        <p:nvPicPr>
-          <p:cNvPr id="11" name="Picture 10"/>
-          <p:cNvPicPr>
-            <a:picLocks noChangeAspect="1"/>
-          </p:cNvPicPr>
-          <p:nvPr/>
-        </p:nvPicPr>
-        <p:blipFill>
-          <a:blip r:embed="rId2"/>
-          <a:stretch>
-            <a:fillRect/>
-          </a:stretch>
-        </p:blipFill>
-        <p:spPr>
-          <a:xfrm>
-            <a:off x="1259304" y="1690688"/>
-            <a:ext cx="8137358" cy="4882415"/>
-          </a:xfrm>
-          <a:prstGeom prst="rect">
-            <a:avLst/>
-          </a:prstGeom>
-        </p:spPr>
-      </p:pic>
       <p:sp>
         <p:nvSpPr>
           <p:cNvPr id="12" name="Right Brace 11"/>
@@ -11450,93 +13160,30 @@
           </a:p>
         </p:txBody>
       </p:sp>
-      <p:sp>
-        <p:nvSpPr>
-          <p:cNvPr id="13" name="TextBox 12"/>
-          <p:cNvSpPr txBox="1"/>
+      <p:pic>
+        <p:nvPicPr>
+          <p:cNvPr id="4" name="Picture 3"/>
+          <p:cNvPicPr>
+            <a:picLocks noChangeAspect="1"/>
+          </p:cNvPicPr>
           <p:nvPr/>
-        </p:nvSpPr>
+        </p:nvPicPr>
+        <p:blipFill>
+          <a:blip r:embed="rId2"/>
+          <a:stretch>
+            <a:fillRect/>
+          </a:stretch>
+        </p:blipFill>
         <p:spPr>
           <a:xfrm>
-            <a:off x="9816178" y="4709123"/>
-            <a:ext cx="2085474" cy="1169551"/>
+            <a:off x="994611" y="1390850"/>
+            <a:ext cx="9111916" cy="5467150"/>
           </a:xfrm>
           <a:prstGeom prst="rect">
             <a:avLst/>
           </a:prstGeom>
-          <a:noFill/>
         </p:spPr>
-        <p:txBody>
-          <a:bodyPr wrap="square" rtlCol="0">
-            <a:spAutoFit/>
-          </a:bodyPr>
-          <a:lstStyle/>
-          <a:p>
-            <a:r>
-              <a:rPr lang="en-US" sz="1400" dirty="0" err="1" smtClean="0">
-                <a:solidFill>
-                  <a:srgbClr val="FF0000"/>
-                </a:solidFill>
-              </a:rPr>
-              <a:t>Qutip</a:t>
-            </a:r>
-            <a:r>
-              <a:rPr lang="en-US" sz="1400" dirty="0">
-                <a:solidFill>
-                  <a:srgbClr val="FF0000"/>
-                </a:solidFill>
-              </a:rPr>
-              <a:t> </a:t>
-            </a:r>
-            <a:r>
-              <a:rPr lang="en-US" sz="1400" dirty="0" smtClean="0">
-                <a:solidFill>
-                  <a:srgbClr val="FF0000"/>
-                </a:solidFill>
-              </a:rPr>
-              <a:t>– Batch Optimizer Inconsistency; Likely due to reduced Hilbert Space of the cavity modes (n = 15 levels in each)</a:t>
-            </a:r>
-            <a:endParaRPr lang="en-US" sz="1400" dirty="0">
-              <a:solidFill>
-                <a:srgbClr val="FF0000"/>
-              </a:solidFill>
-            </a:endParaRPr>
-          </a:p>
-        </p:txBody>
-      </p:sp>
-      <p:cxnSp>
-        <p:nvCxnSpPr>
-          <p:cNvPr id="15" name="Straight Arrow Connector 14"/>
-          <p:cNvCxnSpPr/>
-          <p:nvPr/>
-        </p:nvCxnSpPr>
-        <p:spPr>
-          <a:xfrm flipH="1">
-            <a:off x="6097588" y="5161551"/>
-            <a:ext cx="3587835" cy="66174"/>
-          </a:xfrm>
-          <a:prstGeom prst="straightConnector1">
-            <a:avLst/>
-          </a:prstGeom>
-          <a:ln>
-            <a:tailEnd type="triangle"/>
-          </a:ln>
-        </p:spPr>
-        <p:style>
-          <a:lnRef idx="1">
-            <a:schemeClr val="accent1"/>
-          </a:lnRef>
-          <a:fillRef idx="0">
-            <a:schemeClr val="accent1"/>
-          </a:fillRef>
-          <a:effectRef idx="0">
-            <a:schemeClr val="accent1"/>
-          </a:effectRef>
-          <a:fontRef idx="minor">
-            <a:schemeClr val="tx1"/>
-          </a:fontRef>
-        </p:style>
-      </p:cxnSp>
+      </p:pic>
     </p:spTree>
     <p:extLst>
       <p:ext uri="{BB962C8B-B14F-4D97-AF65-F5344CB8AC3E}">
@@ -11557,7 +13204,7 @@
 </p:sld>
 </file>
 
-<file path=ppt/slides/slide18.xml><?xml version="1.0" encoding="utf-8"?>
+<file path=ppt/slides/slide22.xml><?xml version="1.0" encoding="utf-8"?>
 <p:sld xmlns:a="http://schemas.openxmlformats.org/drawingml/2006/main" xmlns:r="http://schemas.openxmlformats.org/officeDocument/2006/relationships" xmlns:p="http://schemas.openxmlformats.org/presentationml/2006/main">
   <p:cSld>
     <p:spTree>
@@ -11604,30 +13251,6 @@
           </a:p>
         </p:txBody>
       </p:sp>
-      <p:pic>
-        <p:nvPicPr>
-          <p:cNvPr id="9" name="Picture 8"/>
-          <p:cNvPicPr>
-            <a:picLocks noChangeAspect="1"/>
-          </p:cNvPicPr>
-          <p:nvPr/>
-        </p:nvPicPr>
-        <p:blipFill>
-          <a:blip r:embed="rId2"/>
-          <a:stretch>
-            <a:fillRect/>
-          </a:stretch>
-        </p:blipFill>
-        <p:spPr>
-          <a:xfrm>
-            <a:off x="1042736" y="1690688"/>
-            <a:ext cx="7800475" cy="4680285"/>
-          </a:xfrm>
-          <a:prstGeom prst="rect">
-            <a:avLst/>
-          </a:prstGeom>
-        </p:spPr>
-      </p:pic>
       <p:sp>
         <p:nvSpPr>
           <p:cNvPr id="10" name="TextBox 9"/>
@@ -11663,6 +13286,30 @@
           </a:p>
         </p:txBody>
       </p:sp>
+      <p:pic>
+        <p:nvPicPr>
+          <p:cNvPr id="3" name="Picture 2"/>
+          <p:cNvPicPr>
+            <a:picLocks noChangeAspect="1"/>
+          </p:cNvPicPr>
+          <p:nvPr/>
+        </p:nvPicPr>
+        <p:blipFill>
+          <a:blip r:embed="rId2"/>
+          <a:stretch>
+            <a:fillRect/>
+          </a:stretch>
+        </p:blipFill>
+        <p:spPr>
+          <a:xfrm>
+            <a:off x="0" y="1179094"/>
+            <a:ext cx="9019674" cy="5411804"/>
+          </a:xfrm>
+          <a:prstGeom prst="rect">
+            <a:avLst/>
+          </a:prstGeom>
+        </p:spPr>
+      </p:pic>
     </p:spTree>
     <p:extLst>
       <p:ext uri="{BB962C8B-B14F-4D97-AF65-F5344CB8AC3E}">
@@ -11673,10 +13320,17 @@
   <p:clrMapOvr>
     <a:masterClrMapping/>
   </p:clrMapOvr>
+  <p:timing>
+    <p:tnLst>
+      <p:par>
+        <p:cTn id="1" dur="indefinite" restart="never" nodeType="tmRoot"/>
+      </p:par>
+    </p:tnLst>
+  </p:timing>
 </p:sld>
 </file>
 
-<file path=ppt/slides/slide19.xml><?xml version="1.0" encoding="utf-8"?>
+<file path=ppt/slides/slide23.xml><?xml version="1.0" encoding="utf-8"?>
 <p:sld xmlns:a="http://schemas.openxmlformats.org/drawingml/2006/main" xmlns:r="http://schemas.openxmlformats.org/officeDocument/2006/relationships" xmlns:p="http://schemas.openxmlformats.org/presentationml/2006/main">
   <p:cSld>
     <p:spTree>
@@ -13530,390 +15184,7 @@
 </p:sld>
 </file>
 
-<file path=ppt/slides/slide2.xml><?xml version="1.0" encoding="utf-8"?>
-<p:sld xmlns:a="http://schemas.openxmlformats.org/drawingml/2006/main" xmlns:r="http://schemas.openxmlformats.org/officeDocument/2006/relationships" xmlns:p="http://schemas.openxmlformats.org/presentationml/2006/main">
-  <p:cSld>
-    <p:spTree>
-      <p:nvGrpSpPr>
-        <p:cNvPr id="1" name=""/>
-        <p:cNvGrpSpPr/>
-        <p:nvPr/>
-      </p:nvGrpSpPr>
-      <p:grpSpPr>
-        <a:xfrm>
-          <a:off x="0" y="0"/>
-          <a:ext cx="0" cy="0"/>
-          <a:chOff x="0" y="0"/>
-          <a:chExt cx="0" cy="0"/>
-        </a:xfrm>
-      </p:grpSpPr>
-      <p:sp>
-        <p:nvSpPr>
-          <p:cNvPr id="2" name="Title 1"/>
-          <p:cNvSpPr>
-            <a:spLocks noGrp="1"/>
-          </p:cNvSpPr>
-          <p:nvPr>
-            <p:ph type="title"/>
-          </p:nvPr>
-        </p:nvSpPr>
-        <p:spPr/>
-        <p:txBody>
-          <a:bodyPr/>
-          <a:lstStyle/>
-          <a:p>
-            <a:r>
-              <a:rPr lang="en-US" dirty="0" smtClean="0"/>
-              <a:t>Motivation</a:t>
-            </a:r>
-            <a:endParaRPr lang="en-US" dirty="0"/>
-          </a:p>
-        </p:txBody>
-      </p:sp>
-      <mc:AlternateContent xmlns:mc="http://schemas.openxmlformats.org/markup-compatibility/2006" xmlns:a14="http://schemas.microsoft.com/office/drawing/2010/main">
-        <mc:Choice Requires="a14">
-          <p:sp>
-            <p:nvSpPr>
-              <p:cNvPr id="3" name="Content Placeholder 2"/>
-              <p:cNvSpPr>
-                <a:spLocks noGrp="1"/>
-              </p:cNvSpPr>
-              <p:nvPr>
-                <p:ph idx="1"/>
-              </p:nvPr>
-            </p:nvSpPr>
-            <p:spPr/>
-            <p:txBody>
-              <a:bodyPr/>
-              <a:lstStyle/>
-              <a:p>
-                <a:pPr lvl="1"/>
-                <a:r>
-                  <a:rPr lang="en-US" sz="3200" dirty="0" smtClean="0"/>
-                  <a:t>SNAP Gates take time </a:t>
-                </a:r>
-                <a14:m>
-                  <m:oMath xmlns:m="http://schemas.openxmlformats.org/officeDocument/2006/math">
-                    <m:r>
-                      <a:rPr lang="en-US" sz="3200" i="1">
-                        <a:latin typeface="Cambria Math" panose="02040503050406030204" pitchFamily="18" charset="0"/>
-                      </a:rPr>
-                      <m:t>≈2</m:t>
-                    </m:r>
-                    <m:r>
-                      <a:rPr lang="en-US" sz="3200" i="1">
-                        <a:latin typeface="Cambria Math" panose="02040503050406030204" pitchFamily="18" charset="0"/>
-                      </a:rPr>
-                      <m:t>𝜋</m:t>
-                    </m:r>
-                    <m:r>
-                      <a:rPr lang="en-US" sz="3200" i="1">
-                        <a:latin typeface="Cambria Math" panose="02040503050406030204" pitchFamily="18" charset="0"/>
-                      </a:rPr>
-                      <m:t>/</m:t>
-                    </m:r>
-                    <m:r>
-                      <a:rPr lang="en-US" sz="3200" i="1">
-                        <a:latin typeface="Cambria Math" panose="02040503050406030204" pitchFamily="18" charset="0"/>
-                      </a:rPr>
-                      <m:t>𝜒</m:t>
-                    </m:r>
-                  </m:oMath>
-                </a14:m>
-                <a:r>
-                  <a:rPr lang="en-US" sz="3200" dirty="0"/>
-                  <a:t> where </a:t>
-                </a:r>
-                <a14:m>
-                  <m:oMath xmlns:m="http://schemas.openxmlformats.org/officeDocument/2006/math">
-                    <m:r>
-                      <a:rPr lang="en-US" sz="3200" i="1">
-                        <a:latin typeface="Cambria Math" panose="02040503050406030204" pitchFamily="18" charset="0"/>
-                      </a:rPr>
-                      <m:t>𝜒</m:t>
-                    </m:r>
-                    <m:r>
-                      <a:rPr lang="en-US" sz="3200" b="0" i="1" smtClean="0">
-                        <a:latin typeface="Cambria Math" panose="02040503050406030204" pitchFamily="18" charset="0"/>
-                      </a:rPr>
-                      <m:t>≈</m:t>
-                    </m:r>
-                  </m:oMath>
-                </a14:m>
-                <a:r>
-                  <a:rPr lang="en-US" sz="3200" dirty="0" smtClean="0"/>
-                  <a:t> MHz </a:t>
-                </a:r>
-                <a:r>
-                  <a:rPr lang="en-US" sz="3200" dirty="0"/>
-                  <a:t>is dispersive coupling strength.</a:t>
-                </a:r>
-              </a:p>
-              <a:p>
-                <a:pPr lvl="1"/>
-                <a:r>
-                  <a:rPr lang="en-US" sz="3200" dirty="0"/>
-                  <a:t>Reducing Gate time </a:t>
-                </a:r>
-                <a14:m>
-                  <m:oMath xmlns:m="http://schemas.openxmlformats.org/officeDocument/2006/math">
-                    <m:r>
-                      <a:rPr lang="en-US" sz="3200" i="1">
-                        <a:latin typeface="Cambria Math" panose="02040503050406030204" pitchFamily="18" charset="0"/>
-                      </a:rPr>
-                      <m:t>→ </m:t>
-                    </m:r>
-                  </m:oMath>
-                </a14:m>
-                <a:r>
-                  <a:rPr lang="en-US" sz="3200" dirty="0"/>
-                  <a:t>Increasing </a:t>
-                </a:r>
-                <a14:m>
-                  <m:oMath xmlns:m="http://schemas.openxmlformats.org/officeDocument/2006/math">
-                    <m:r>
-                      <a:rPr lang="en-US" sz="3200" i="1">
-                        <a:latin typeface="Cambria Math" panose="02040503050406030204" pitchFamily="18" charset="0"/>
-                      </a:rPr>
-                      <m:t>𝜒</m:t>
-                    </m:r>
-                  </m:oMath>
-                </a14:m>
-                <a:r>
-                  <a:rPr lang="en-US" sz="3200" dirty="0"/>
-                  <a:t> </a:t>
-                </a:r>
-                <a14:m>
-                  <m:oMath xmlns:m="http://schemas.openxmlformats.org/officeDocument/2006/math">
-                    <m:r>
-                      <a:rPr lang="en-US" sz="3200" i="1">
-                        <a:latin typeface="Cambria Math" panose="02040503050406030204" pitchFamily="18" charset="0"/>
-                      </a:rPr>
-                      <m:t>→</m:t>
-                    </m:r>
-                  </m:oMath>
-                </a14:m>
-                <a:r>
-                  <a:rPr lang="en-US" sz="3200" dirty="0"/>
-                  <a:t>Reducing lifetime of cavity</a:t>
-                </a:r>
-              </a:p>
-              <a:p>
-                <a:pPr lvl="1"/>
-                <a:r>
-                  <a:rPr lang="en-US" sz="3200" dirty="0"/>
-                  <a:t>ECD Idea: Keep </a:t>
-                </a:r>
-                <a14:m>
-                  <m:oMath xmlns:m="http://schemas.openxmlformats.org/officeDocument/2006/math">
-                    <m:r>
-                      <a:rPr lang="en-US" sz="3200" i="1">
-                        <a:latin typeface="Cambria Math" panose="02040503050406030204" pitchFamily="18" charset="0"/>
-                      </a:rPr>
-                      <m:t>𝜒</m:t>
-                    </m:r>
-                    <m:r>
-                      <a:rPr lang="en-US" sz="3200" b="0" i="1" smtClean="0">
-                        <a:latin typeface="Cambria Math" panose="02040503050406030204" pitchFamily="18" charset="0"/>
-                      </a:rPr>
-                      <m:t>≈10</m:t>
-                    </m:r>
-                  </m:oMath>
-                </a14:m>
-                <a:r>
-                  <a:rPr lang="en-US" sz="3200" dirty="0" smtClean="0"/>
-                  <a:t> kHz small; </a:t>
-                </a:r>
-                <a:r>
-                  <a:rPr lang="en-US" sz="3200" dirty="0"/>
-                  <a:t>But enhance it by displacing cavity (</a:t>
-                </a:r>
-                <a14:m>
-                  <m:oMath xmlns:m="http://schemas.openxmlformats.org/officeDocument/2006/math">
-                    <m:sSub>
-                      <m:sSubPr>
-                        <m:ctrlPr>
-                          <a:rPr lang="en-US" sz="3200" i="1">
-                            <a:latin typeface="Cambria Math" panose="02040503050406030204" pitchFamily="18" charset="0"/>
-                          </a:rPr>
-                        </m:ctrlPr>
-                      </m:sSubPr>
-                      <m:e>
-                        <m:r>
-                          <a:rPr lang="en-US" sz="3200" i="1">
-                            <a:latin typeface="Cambria Math" panose="02040503050406030204" pitchFamily="18" charset="0"/>
-                          </a:rPr>
-                          <m:t>𝛼</m:t>
-                        </m:r>
-                      </m:e>
-                      <m:sub>
-                        <m:r>
-                          <a:rPr lang="en-US" sz="3200" i="1">
-                            <a:latin typeface="Cambria Math" panose="02040503050406030204" pitchFamily="18" charset="0"/>
-                          </a:rPr>
-                          <m:t>0</m:t>
-                        </m:r>
-                      </m:sub>
-                    </m:sSub>
-                  </m:oMath>
-                </a14:m>
-                <a:r>
-                  <a:rPr lang="en-US" sz="3200" dirty="0"/>
-                  <a:t>) far from origin</a:t>
-                </a:r>
-              </a:p>
-              <a:p>
-                <a:pPr lvl="1"/>
-                <a:r>
-                  <a:rPr lang="en-US" sz="3200" dirty="0"/>
-                  <a:t> Effective Gate time </a:t>
-                </a:r>
-                <a14:m>
-                  <m:oMath xmlns:m="http://schemas.openxmlformats.org/officeDocument/2006/math">
-                    <m:r>
-                      <a:rPr lang="en-US" sz="3200" i="1">
-                        <a:latin typeface="Cambria Math" panose="02040503050406030204" pitchFamily="18" charset="0"/>
-                      </a:rPr>
-                      <m:t>1/</m:t>
-                    </m:r>
-                    <m:r>
-                      <a:rPr lang="en-US" sz="3200" i="1">
-                        <a:latin typeface="Cambria Math" panose="02040503050406030204" pitchFamily="18" charset="0"/>
-                      </a:rPr>
-                      <m:t>𝜒</m:t>
-                    </m:r>
-                    <m:sSub>
-                      <m:sSubPr>
-                        <m:ctrlPr>
-                          <a:rPr lang="en-US" sz="3200" i="1">
-                            <a:latin typeface="Cambria Math" panose="02040503050406030204" pitchFamily="18" charset="0"/>
-                          </a:rPr>
-                        </m:ctrlPr>
-                      </m:sSubPr>
-                      <m:e>
-                        <m:r>
-                          <a:rPr lang="en-US" sz="3200" i="1">
-                            <a:latin typeface="Cambria Math" panose="02040503050406030204" pitchFamily="18" charset="0"/>
-                          </a:rPr>
-                          <m:t>𝛼</m:t>
-                        </m:r>
-                      </m:e>
-                      <m:sub>
-                        <m:r>
-                          <a:rPr lang="en-US" sz="3200" i="1">
-                            <a:latin typeface="Cambria Math" panose="02040503050406030204" pitchFamily="18" charset="0"/>
-                          </a:rPr>
-                          <m:t>0</m:t>
-                        </m:r>
-                      </m:sub>
-                    </m:sSub>
-                  </m:oMath>
-                </a14:m>
-                <a:r>
-                  <a:rPr lang="en-US" sz="3200" dirty="0"/>
-                  <a:t> where </a:t>
-                </a:r>
-                <a14:m>
-                  <m:oMath xmlns:m="http://schemas.openxmlformats.org/officeDocument/2006/math">
-                    <m:sSub>
-                      <m:sSubPr>
-                        <m:ctrlPr>
-                          <a:rPr lang="en-US" sz="3200" i="1">
-                            <a:latin typeface="Cambria Math" panose="02040503050406030204" pitchFamily="18" charset="0"/>
-                          </a:rPr>
-                        </m:ctrlPr>
-                      </m:sSubPr>
-                      <m:e>
-                        <m:r>
-                          <a:rPr lang="en-US" sz="3200" i="1">
-                            <a:latin typeface="Cambria Math" panose="02040503050406030204" pitchFamily="18" charset="0"/>
-                          </a:rPr>
-                          <m:t>𝛼</m:t>
-                        </m:r>
-                      </m:e>
-                      <m:sub>
-                        <m:r>
-                          <a:rPr lang="en-US" sz="3200" i="1">
-                            <a:latin typeface="Cambria Math" panose="02040503050406030204" pitchFamily="18" charset="0"/>
-                          </a:rPr>
-                          <m:t>0</m:t>
-                        </m:r>
-                      </m:sub>
-                    </m:sSub>
-                    <m:r>
-                      <a:rPr lang="en-US" sz="3200" i="1">
-                        <a:latin typeface="Cambria Math" panose="02040503050406030204" pitchFamily="18" charset="0"/>
-                      </a:rPr>
-                      <m:t>≫1</m:t>
-                    </m:r>
-                  </m:oMath>
-                </a14:m>
-                <a:endParaRPr lang="en-US" sz="3200" dirty="0"/>
-              </a:p>
-              <a:p>
-                <a:pPr marL="0" indent="0">
-                  <a:buNone/>
-                </a:pPr>
-                <a:endParaRPr lang="en-US" dirty="0"/>
-              </a:p>
-            </p:txBody>
-          </p:sp>
-        </mc:Choice>
-        <mc:Fallback xmlns="">
-          <p:sp>
-            <p:nvSpPr>
-              <p:cNvPr id="3" name="Content Placeholder 2"/>
-              <p:cNvSpPr>
-                <a:spLocks noGrp="1" noRot="1" noChangeAspect="1" noMove="1" noResize="1" noEditPoints="1" noAdjustHandles="1" noChangeArrowheads="1" noChangeShapeType="1" noTextEdit="1"/>
-              </p:cNvSpPr>
-              <p:nvPr>
-                <p:ph idx="1"/>
-              </p:nvPr>
-            </p:nvSpPr>
-            <p:spPr>
-              <a:blipFill rotWithShape="0">
-                <a:blip r:embed="rId2"/>
-                <a:stretch>
-                  <a:fillRect t="-2801" r="-986"/>
-                </a:stretch>
-              </a:blipFill>
-            </p:spPr>
-            <p:txBody>
-              <a:bodyPr/>
-              <a:lstStyle/>
-              <a:p>
-                <a:r>
-                  <a:rPr lang="en-US">
-                    <a:noFill/>
-                  </a:rPr>
-                  <a:t> </a:t>
-                </a:r>
-              </a:p>
-            </p:txBody>
-          </p:sp>
-        </mc:Fallback>
-      </mc:AlternateContent>
-    </p:spTree>
-    <p:extLst>
-      <p:ext uri="{BB962C8B-B14F-4D97-AF65-F5344CB8AC3E}">
-        <p14:creationId xmlns:p14="http://schemas.microsoft.com/office/powerpoint/2010/main" val="1584008509"/>
-      </p:ext>
-    </p:extLst>
-  </p:cSld>
-  <p:clrMapOvr>
-    <a:masterClrMapping/>
-  </p:clrMapOvr>
-  <p:timing>
-    <p:tnLst>
-      <p:par>
-        <p:cTn id="1" dur="indefinite" restart="never" nodeType="tmRoot"/>
-      </p:par>
-    </p:tnLst>
-  </p:timing>
-</p:sld>
-</file>
-
-<file path=ppt/slides/slide20.xml><?xml version="1.0" encoding="utf-8"?>
+<file path=ppt/slides/slide24.xml><?xml version="1.0" encoding="utf-8"?>
 <p:sld xmlns:a="http://schemas.openxmlformats.org/drawingml/2006/main" xmlns:r="http://schemas.openxmlformats.org/officeDocument/2006/relationships" xmlns:p="http://schemas.openxmlformats.org/presentationml/2006/main">
   <p:cSld>
     <p:spTree>
@@ -17050,10 +18321,17 @@
   <p:clrMapOvr>
     <a:masterClrMapping/>
   </p:clrMapOvr>
+  <p:timing>
+    <p:tnLst>
+      <p:par>
+        <p:cTn id="1" dur="indefinite" restart="never" nodeType="tmRoot"/>
+      </p:par>
+    </p:tnLst>
+  </p:timing>
 </p:sld>
 </file>
 
-<file path=ppt/slides/slide21.xml><?xml version="1.0" encoding="utf-8"?>
+<file path=ppt/slides/slide25.xml><?xml version="1.0" encoding="utf-8"?>
 <p:sld xmlns:a="http://schemas.openxmlformats.org/drawingml/2006/main" xmlns:r="http://schemas.openxmlformats.org/officeDocument/2006/relationships" xmlns:p="http://schemas.openxmlformats.org/presentationml/2006/main">
   <p:cSld>
     <p:spTree>
@@ -17144,6 +18422,13 @@
   <p:clrMapOvr>
     <a:masterClrMapping/>
   </p:clrMapOvr>
+  <p:timing>
+    <p:tnLst>
+      <p:par>
+        <p:cTn id="1" dur="indefinite" restart="never" nodeType="tmRoot"/>
+      </p:par>
+    </p:tnLst>
+  </p:timing>
 </p:sld>
 </file>
 
@@ -20642,6 +21927,13 @@
   <p:clrMapOvr>
     <a:masterClrMapping/>
   </p:clrMapOvr>
+  <p:timing>
+    <p:tnLst>
+      <p:par>
+        <p:cTn id="1" dur="indefinite" restart="never" nodeType="tmRoot"/>
+      </p:par>
+    </p:tnLst>
+  </p:timing>
 </p:sld>
 </file>
 

</xml_diff>